<commit_message>
added CDC data and data viz tasks and modified ppt
</commit_message>
<xml_diff>
--- a/slides/Implementation in Tableau.pptx
+++ b/slides/Implementation in Tableau.pptx
@@ -26,13 +26,6 @@
     <p:sldId id="266" r:id="rId20"/>
     <p:sldId id="267" r:id="rId21"/>
     <p:sldId id="268" r:id="rId22"/>
-    <p:sldId id="382" r:id="rId23"/>
-    <p:sldId id="372" r:id="rId24"/>
-    <p:sldId id="373" r:id="rId25"/>
-    <p:sldId id="388" r:id="rId26"/>
-    <p:sldId id="387" r:id="rId27"/>
-    <p:sldId id="386" r:id="rId28"/>
-    <p:sldId id="389" r:id="rId29"/>
   </p:sldIdLst>
   <p:sldSz cx="12192000" cy="6858000"/>
   <p:notesSz cx="6858000" cy="9144000"/>
@@ -286,7 +279,7 @@
           <a:p>
             <a:fld id="{6EEB9A7E-E863-4E9B-A084-BB9E6993F16A}" type="datetimeFigureOut">
               <a:rPr lang="en-US" smtClean="0"/>
-              <a:t>5/14/2019</a:t>
+              <a:t>5/24/2019</a:t>
             </a:fld>
             <a:endParaRPr lang="en-US"/>
           </a:p>
@@ -484,7 +477,7 @@
           <a:p>
             <a:fld id="{6EEB9A7E-E863-4E9B-A084-BB9E6993F16A}" type="datetimeFigureOut">
               <a:rPr lang="en-US" smtClean="0"/>
-              <a:t>5/14/2019</a:t>
+              <a:t>5/24/2019</a:t>
             </a:fld>
             <a:endParaRPr lang="en-US"/>
           </a:p>
@@ -692,7 +685,7 @@
           <a:p>
             <a:fld id="{6EEB9A7E-E863-4E9B-A084-BB9E6993F16A}" type="datetimeFigureOut">
               <a:rPr lang="en-US" smtClean="0"/>
-              <a:t>5/14/2019</a:t>
+              <a:t>5/24/2019</a:t>
             </a:fld>
             <a:endParaRPr lang="en-US"/>
           </a:p>
@@ -890,7 +883,7 @@
           <a:p>
             <a:fld id="{6EEB9A7E-E863-4E9B-A084-BB9E6993F16A}" type="datetimeFigureOut">
               <a:rPr lang="en-US" smtClean="0"/>
-              <a:t>5/14/2019</a:t>
+              <a:t>5/24/2019</a:t>
             </a:fld>
             <a:endParaRPr lang="en-US"/>
           </a:p>
@@ -1165,7 +1158,7 @@
           <a:p>
             <a:fld id="{6EEB9A7E-E863-4E9B-A084-BB9E6993F16A}" type="datetimeFigureOut">
               <a:rPr lang="en-US" smtClean="0"/>
-              <a:t>5/14/2019</a:t>
+              <a:t>5/24/2019</a:t>
             </a:fld>
             <a:endParaRPr lang="en-US"/>
           </a:p>
@@ -1430,7 +1423,7 @@
           <a:p>
             <a:fld id="{6EEB9A7E-E863-4E9B-A084-BB9E6993F16A}" type="datetimeFigureOut">
               <a:rPr lang="en-US" smtClean="0"/>
-              <a:t>5/14/2019</a:t>
+              <a:t>5/24/2019</a:t>
             </a:fld>
             <a:endParaRPr lang="en-US"/>
           </a:p>
@@ -1842,7 +1835,7 @@
           <a:p>
             <a:fld id="{6EEB9A7E-E863-4E9B-A084-BB9E6993F16A}" type="datetimeFigureOut">
               <a:rPr lang="en-US" smtClean="0"/>
-              <a:t>5/14/2019</a:t>
+              <a:t>5/24/2019</a:t>
             </a:fld>
             <a:endParaRPr lang="en-US"/>
           </a:p>
@@ -1983,7 +1976,7 @@
           <a:p>
             <a:fld id="{6EEB9A7E-E863-4E9B-A084-BB9E6993F16A}" type="datetimeFigureOut">
               <a:rPr lang="en-US" smtClean="0"/>
-              <a:t>5/14/2019</a:t>
+              <a:t>5/24/2019</a:t>
             </a:fld>
             <a:endParaRPr lang="en-US"/>
           </a:p>
@@ -2096,7 +2089,7 @@
           <a:p>
             <a:fld id="{6EEB9A7E-E863-4E9B-A084-BB9E6993F16A}" type="datetimeFigureOut">
               <a:rPr lang="en-US" smtClean="0"/>
-              <a:t>5/14/2019</a:t>
+              <a:t>5/24/2019</a:t>
             </a:fld>
             <a:endParaRPr lang="en-US"/>
           </a:p>
@@ -2407,7 +2400,7 @@
           <a:p>
             <a:fld id="{6EEB9A7E-E863-4E9B-A084-BB9E6993F16A}" type="datetimeFigureOut">
               <a:rPr lang="en-US" smtClean="0"/>
-              <a:t>5/14/2019</a:t>
+              <a:t>5/24/2019</a:t>
             </a:fld>
             <a:endParaRPr lang="en-US"/>
           </a:p>
@@ -2695,7 +2688,7 @@
           <a:p>
             <a:fld id="{6EEB9A7E-E863-4E9B-A084-BB9E6993F16A}" type="datetimeFigureOut">
               <a:rPr lang="en-US" smtClean="0"/>
-              <a:t>5/14/2019</a:t>
+              <a:t>5/24/2019</a:t>
             </a:fld>
             <a:endParaRPr lang="en-US"/>
           </a:p>
@@ -2936,7 +2929,7 @@
           <a:p>
             <a:fld id="{6EEB9A7E-E863-4E9B-A084-BB9E6993F16A}" type="datetimeFigureOut">
               <a:rPr lang="en-US" smtClean="0"/>
-              <a:t>5/14/2019</a:t>
+              <a:t>5/24/2019</a:t>
             </a:fld>
             <a:endParaRPr lang="en-US"/>
           </a:p>
@@ -3389,18 +3382,6 @@
   <p:clrMapOvr>
     <a:masterClrMapping/>
   </p:clrMapOvr>
-  <mc:AlternateContent xmlns:mc="http://schemas.openxmlformats.org/markup-compatibility/2006" xmlns:p14="http://schemas.microsoft.com/office/powerpoint/2010/main">
-    <mc:Choice Requires="p14">
-      <p:transition spd="med" p14:dur="700">
-        <p:fade/>
-      </p:transition>
-    </mc:Choice>
-    <mc:Fallback xmlns="">
-      <p:transition spd="med">
-        <p:fade/>
-      </p:transition>
-    </mc:Fallback>
-  </mc:AlternateContent>
 </p:sld>
 </file>
 
@@ -3632,18 +3613,6 @@
   <p:clrMapOvr>
     <a:masterClrMapping/>
   </p:clrMapOvr>
-  <mc:AlternateContent xmlns:mc="http://schemas.openxmlformats.org/markup-compatibility/2006" xmlns:p14="http://schemas.microsoft.com/office/powerpoint/2010/main">
-    <mc:Choice Requires="p14">
-      <p:transition spd="med" p14:dur="700">
-        <p:fade/>
-      </p:transition>
-    </mc:Choice>
-    <mc:Fallback xmlns="">
-      <p:transition spd="med">
-        <p:fade/>
-      </p:transition>
-    </mc:Fallback>
-  </mc:AlternateContent>
 </p:sld>
 </file>
 
@@ -4046,18 +4015,6 @@
   <p:clrMapOvr>
     <a:masterClrMapping/>
   </p:clrMapOvr>
-  <mc:AlternateContent xmlns:mc="http://schemas.openxmlformats.org/markup-compatibility/2006" xmlns:p14="http://schemas.microsoft.com/office/powerpoint/2010/main">
-    <mc:Choice Requires="p14">
-      <p:transition spd="med" p14:dur="700">
-        <p:fade/>
-      </p:transition>
-    </mc:Choice>
-    <mc:Fallback xmlns="">
-      <p:transition spd="med">
-        <p:fade/>
-      </p:transition>
-    </mc:Fallback>
-  </mc:AlternateContent>
 </p:sld>
 </file>
 
@@ -4501,18 +4458,6 @@
   <p:clrMapOvr>
     <a:masterClrMapping/>
   </p:clrMapOvr>
-  <mc:AlternateContent xmlns:mc="http://schemas.openxmlformats.org/markup-compatibility/2006" xmlns:p14="http://schemas.microsoft.com/office/powerpoint/2010/main">
-    <mc:Choice Requires="p14">
-      <p:transition spd="med" p14:dur="700">
-        <p:fade/>
-      </p:transition>
-    </mc:Choice>
-    <mc:Fallback xmlns="">
-      <p:transition spd="med">
-        <p:fade/>
-      </p:transition>
-    </mc:Fallback>
-  </mc:AlternateContent>
 </p:sld>
 </file>
 
@@ -4847,18 +4792,6 @@
   <p:clrMapOvr>
     <a:masterClrMapping/>
   </p:clrMapOvr>
-  <mc:AlternateContent xmlns:mc="http://schemas.openxmlformats.org/markup-compatibility/2006" xmlns:p14="http://schemas.microsoft.com/office/powerpoint/2010/main">
-    <mc:Choice Requires="p14">
-      <p:transition spd="med" p14:dur="700">
-        <p:fade/>
-      </p:transition>
-    </mc:Choice>
-    <mc:Fallback xmlns="">
-      <p:transition spd="med">
-        <p:fade/>
-      </p:transition>
-    </mc:Fallback>
-  </mc:AlternateContent>
 </p:sld>
 </file>
 
@@ -5364,18 +5297,6 @@
   <p:clrMapOvr>
     <a:masterClrMapping/>
   </p:clrMapOvr>
-  <mc:AlternateContent xmlns:mc="http://schemas.openxmlformats.org/markup-compatibility/2006" xmlns:p14="http://schemas.microsoft.com/office/powerpoint/2010/main">
-    <mc:Choice Requires="p14">
-      <p:transition spd="med" p14:dur="700">
-        <p:fade/>
-      </p:transition>
-    </mc:Choice>
-    <mc:Fallback xmlns="">
-      <p:transition spd="med">
-        <p:fade/>
-      </p:transition>
-    </mc:Fallback>
-  </mc:AlternateContent>
 </p:sld>
 </file>
 
@@ -5980,18 +5901,6 @@
   <p:clrMapOvr>
     <a:masterClrMapping/>
   </p:clrMapOvr>
-  <mc:AlternateContent xmlns:mc="http://schemas.openxmlformats.org/markup-compatibility/2006" xmlns:p14="http://schemas.microsoft.com/office/powerpoint/2010/main">
-    <mc:Choice Requires="p14">
-      <p:transition spd="med" p14:dur="700">
-        <p:fade/>
-      </p:transition>
-    </mc:Choice>
-    <mc:Fallback xmlns="">
-      <p:transition spd="med">
-        <p:fade/>
-      </p:transition>
-    </mc:Fallback>
-  </mc:AlternateContent>
 </p:sld>
 </file>
 
@@ -6218,18 +6127,6 @@
   <p:clrMapOvr>
     <a:masterClrMapping/>
   </p:clrMapOvr>
-  <mc:AlternateContent xmlns:mc="http://schemas.openxmlformats.org/markup-compatibility/2006" xmlns:p14="http://schemas.microsoft.com/office/powerpoint/2010/main">
-    <mc:Choice Requires="p14">
-      <p:transition spd="med" p14:dur="700">
-        <p:fade/>
-      </p:transition>
-    </mc:Choice>
-    <mc:Fallback xmlns="">
-      <p:transition spd="med">
-        <p:fade/>
-      </p:transition>
-    </mc:Fallback>
-  </mc:AlternateContent>
 </p:sld>
 </file>
 
@@ -6402,18 +6299,6 @@
   <p:clrMapOvr>
     <a:masterClrMapping/>
   </p:clrMapOvr>
-  <mc:AlternateContent xmlns:mc="http://schemas.openxmlformats.org/markup-compatibility/2006" xmlns:p14="http://schemas.microsoft.com/office/powerpoint/2010/main">
-    <mc:Choice Requires="p14">
-      <p:transition spd="med" p14:dur="700">
-        <p:fade/>
-      </p:transition>
-    </mc:Choice>
-    <mc:Fallback xmlns="">
-      <p:transition spd="med">
-        <p:fade/>
-      </p:transition>
-    </mc:Fallback>
-  </mc:AlternateContent>
 </p:sld>
 </file>
 
@@ -6669,18 +6554,6 @@
   <p:clrMapOvr>
     <a:masterClrMapping/>
   </p:clrMapOvr>
-  <mc:AlternateContent xmlns:mc="http://schemas.openxmlformats.org/markup-compatibility/2006" xmlns:p14="http://schemas.microsoft.com/office/powerpoint/2010/main">
-    <mc:Choice Requires="p14">
-      <p:transition spd="med" p14:dur="700">
-        <p:fade/>
-      </p:transition>
-    </mc:Choice>
-    <mc:Fallback xmlns="">
-      <p:transition spd="med">
-        <p:fade/>
-      </p:transition>
-    </mc:Fallback>
-  </mc:AlternateContent>
 </p:sld>
 </file>
 
@@ -6922,18 +6795,6 @@
   <p:clrMapOvr>
     <a:masterClrMapping/>
   </p:clrMapOvr>
-  <mc:AlternateContent xmlns:mc="http://schemas.openxmlformats.org/markup-compatibility/2006" xmlns:p14="http://schemas.microsoft.com/office/powerpoint/2010/main">
-    <mc:Choice Requires="p14">
-      <p:transition spd="med" p14:dur="700">
-        <p:fade/>
-      </p:transition>
-    </mc:Choice>
-    <mc:Fallback xmlns="">
-      <p:transition spd="med">
-        <p:fade/>
-      </p:transition>
-    </mc:Fallback>
-  </mc:AlternateContent>
 </p:sld>
 </file>
 
@@ -7078,18 +6939,6 @@
   <p:clrMapOvr>
     <a:masterClrMapping/>
   </p:clrMapOvr>
-  <mc:AlternateContent xmlns:mc="http://schemas.openxmlformats.org/markup-compatibility/2006" xmlns:p14="http://schemas.microsoft.com/office/powerpoint/2010/main">
-    <mc:Choice Requires="p14">
-      <p:transition spd="med" p14:dur="700">
-        <p:fade/>
-      </p:transition>
-    </mc:Choice>
-    <mc:Fallback xmlns="">
-      <p:transition spd="med">
-        <p:fade/>
-      </p:transition>
-    </mc:Fallback>
-  </mc:AlternateContent>
 </p:sld>
 </file>
 
@@ -7256,18 +7105,6 @@
   <p:clrMapOvr>
     <a:masterClrMapping/>
   </p:clrMapOvr>
-  <mc:AlternateContent xmlns:mc="http://schemas.openxmlformats.org/markup-compatibility/2006" xmlns:p14="http://schemas.microsoft.com/office/powerpoint/2010/main">
-    <mc:Choice Requires="p14">
-      <p:transition spd="med" p14:dur="700">
-        <p:fade/>
-      </p:transition>
-    </mc:Choice>
-    <mc:Fallback xmlns="">
-      <p:transition spd="med">
-        <p:fade/>
-      </p:transition>
-    </mc:Fallback>
-  </mc:AlternateContent>
 </p:sld>
 </file>
 
@@ -7420,2799 +7257,6 @@
     <p:extLst>
       <p:ext uri="{BB962C8B-B14F-4D97-AF65-F5344CB8AC3E}">
         <p14:creationId xmlns:p14="http://schemas.microsoft.com/office/powerpoint/2010/main" val="3632409175"/>
-      </p:ext>
-    </p:extLst>
-  </p:cSld>
-  <p:clrMapOvr>
-    <a:masterClrMapping/>
-  </p:clrMapOvr>
-  <mc:AlternateContent xmlns:mc="http://schemas.openxmlformats.org/markup-compatibility/2006" xmlns:p14="http://schemas.microsoft.com/office/powerpoint/2010/main">
-    <mc:Choice Requires="p14">
-      <p:transition spd="med" p14:dur="700">
-        <p:fade/>
-      </p:transition>
-    </mc:Choice>
-    <mc:Fallback xmlns="">
-      <p:transition spd="med">
-        <p:fade/>
-      </p:transition>
-    </mc:Fallback>
-  </mc:AlternateContent>
-</p:sld>
-</file>
-
-<file path=ppt/slides/slide22.xml><?xml version="1.0" encoding="utf-8"?>
-<p:sld xmlns:a="http://schemas.openxmlformats.org/drawingml/2006/main" xmlns:r="http://schemas.openxmlformats.org/officeDocument/2006/relationships" xmlns:p="http://schemas.openxmlformats.org/presentationml/2006/main">
-  <p:cSld>
-    <p:spTree>
-      <p:nvGrpSpPr>
-        <p:cNvPr id="1" name=""/>
-        <p:cNvGrpSpPr/>
-        <p:nvPr/>
-      </p:nvGrpSpPr>
-      <p:grpSpPr>
-        <a:xfrm>
-          <a:off x="0" y="0"/>
-          <a:ext cx="0" cy="0"/>
-          <a:chOff x="0" y="0"/>
-          <a:chExt cx="0" cy="0"/>
-        </a:xfrm>
-      </p:grpSpPr>
-      <p:sp>
-        <p:nvSpPr>
-          <p:cNvPr id="2" name="Title 1">
-            <a:extLst>
-              <a:ext uri="{FF2B5EF4-FFF2-40B4-BE49-F238E27FC236}">
-                <a16:creationId xmlns:a16="http://schemas.microsoft.com/office/drawing/2014/main" id="{755D89B6-81A6-4B64-9721-EB102122AB4D}"/>
-              </a:ext>
-            </a:extLst>
-          </p:cNvPr>
-          <p:cNvSpPr>
-            <a:spLocks noGrp="1"/>
-          </p:cNvSpPr>
-          <p:nvPr>
-            <p:ph type="title"/>
-          </p:nvPr>
-        </p:nvSpPr>
-        <p:spPr/>
-        <p:txBody>
-          <a:bodyPr/>
-          <a:lstStyle/>
-          <a:p>
-            <a:r>
-              <a:rPr lang="en-US" dirty="0"/>
-              <a:t>Introductory viz assignment task #1</a:t>
-            </a:r>
-          </a:p>
-        </p:txBody>
-      </p:sp>
-      <p:pic>
-        <p:nvPicPr>
-          <p:cNvPr id="5" name="Picture 4">
-            <a:extLst>
-              <a:ext uri="{FF2B5EF4-FFF2-40B4-BE49-F238E27FC236}">
-                <a16:creationId xmlns:a16="http://schemas.microsoft.com/office/drawing/2014/main" id="{1A73558D-79C7-45E5-BB1A-F50F5CAE1681}"/>
-              </a:ext>
-            </a:extLst>
-          </p:cNvPr>
-          <p:cNvPicPr>
-            <a:picLocks noChangeAspect="1"/>
-          </p:cNvPicPr>
-          <p:nvPr/>
-        </p:nvPicPr>
-        <p:blipFill>
-          <a:blip r:embed="rId2">
-            <a:extLst>
-              <a:ext uri="{28A0092B-C50C-407E-A947-70E740481C1C}">
-                <a14:useLocalDpi xmlns:a14="http://schemas.microsoft.com/office/drawing/2010/main" val="0"/>
-              </a:ext>
-            </a:extLst>
-          </a:blip>
-          <a:stretch>
-            <a:fillRect/>
-          </a:stretch>
-        </p:blipFill>
-        <p:spPr>
-          <a:xfrm>
-            <a:off x="838200" y="1681452"/>
-            <a:ext cx="5892560" cy="4445698"/>
-          </a:xfrm>
-          <a:prstGeom prst="rect">
-            <a:avLst/>
-          </a:prstGeom>
-        </p:spPr>
-      </p:pic>
-      <p:sp>
-        <p:nvSpPr>
-          <p:cNvPr id="7" name="TextBox 6">
-            <a:extLst>
-              <a:ext uri="{FF2B5EF4-FFF2-40B4-BE49-F238E27FC236}">
-                <a16:creationId xmlns:a16="http://schemas.microsoft.com/office/drawing/2014/main" id="{5166A974-9D1F-481B-B602-9655A2C5705C}"/>
-              </a:ext>
-            </a:extLst>
-          </p:cNvPr>
-          <p:cNvSpPr txBox="1"/>
-          <p:nvPr/>
-        </p:nvSpPr>
-        <p:spPr>
-          <a:xfrm>
-            <a:off x="7376161" y="2186609"/>
-            <a:ext cx="4538748" cy="3970318"/>
-          </a:xfrm>
-          <a:prstGeom prst="rect">
-            <a:avLst/>
-          </a:prstGeom>
-          <a:noFill/>
-        </p:spPr>
-        <p:txBody>
-          <a:bodyPr wrap="square" rtlCol="0">
-            <a:spAutoFit/>
-          </a:bodyPr>
-          <a:lstStyle/>
-          <a:p>
-            <a:pPr marL="514350" indent="-514350">
-              <a:buFont typeface="+mj-lt"/>
-              <a:buAutoNum type="arabicPeriod"/>
-            </a:pPr>
-            <a:r>
-              <a:rPr lang="en-US" sz="2800" dirty="0"/>
-              <a:t>What appears to be this visualization’s primary message?  Is the message clear, the way the visualization is designed?</a:t>
-            </a:r>
-          </a:p>
-          <a:p>
-            <a:pPr marL="514350" indent="-514350">
-              <a:buFont typeface="+mj-lt"/>
-              <a:buAutoNum type="arabicPeriod"/>
-            </a:pPr>
-            <a:r>
-              <a:rPr lang="en-US" sz="2800" dirty="0"/>
-              <a:t>How could we improve the clarity of its message by employing principles of visual perception?</a:t>
-            </a:r>
-          </a:p>
-        </p:txBody>
-      </p:sp>
-    </p:spTree>
-    <p:extLst>
-      <p:ext uri="{BB962C8B-B14F-4D97-AF65-F5344CB8AC3E}">
-        <p14:creationId xmlns:p14="http://schemas.microsoft.com/office/powerpoint/2010/main" val="1148068805"/>
-      </p:ext>
-    </p:extLst>
-  </p:cSld>
-  <p:clrMapOvr>
-    <a:masterClrMapping/>
-  </p:clrMapOvr>
-</p:sld>
-</file>
-
-<file path=ppt/slides/slide23.xml><?xml version="1.0" encoding="utf-8"?>
-<p:sld xmlns:a="http://schemas.openxmlformats.org/drawingml/2006/main" xmlns:r="http://schemas.openxmlformats.org/officeDocument/2006/relationships" xmlns:p="http://schemas.openxmlformats.org/presentationml/2006/main">
-  <p:cSld>
-    <p:spTree>
-      <p:nvGrpSpPr>
-        <p:cNvPr id="1" name=""/>
-        <p:cNvGrpSpPr/>
-        <p:nvPr/>
-      </p:nvGrpSpPr>
-      <p:grpSpPr>
-        <a:xfrm>
-          <a:off x="0" y="0"/>
-          <a:ext cx="0" cy="0"/>
-          <a:chOff x="0" y="0"/>
-          <a:chExt cx="0" cy="0"/>
-        </a:xfrm>
-      </p:grpSpPr>
-      <p:sp>
-        <p:nvSpPr>
-          <p:cNvPr id="2" name="Title 1">
-            <a:extLst>
-              <a:ext uri="{FF2B5EF4-FFF2-40B4-BE49-F238E27FC236}">
-                <a16:creationId xmlns:a16="http://schemas.microsoft.com/office/drawing/2014/main" id="{755D89B6-81A6-4B64-9721-EB102122AB4D}"/>
-              </a:ext>
-            </a:extLst>
-          </p:cNvPr>
-          <p:cNvSpPr>
-            <a:spLocks noGrp="1"/>
-          </p:cNvSpPr>
-          <p:nvPr>
-            <p:ph type="title"/>
-          </p:nvPr>
-        </p:nvSpPr>
-        <p:spPr/>
-        <p:txBody>
-          <a:bodyPr/>
-          <a:lstStyle/>
-          <a:p>
-            <a:r>
-              <a:rPr lang="en-US" dirty="0"/>
-              <a:t>Example “Advanced viz assignment task”</a:t>
-            </a:r>
-          </a:p>
-        </p:txBody>
-      </p:sp>
-      <p:pic>
-        <p:nvPicPr>
-          <p:cNvPr id="4" name="Picture 3">
-            <a:extLst>
-              <a:ext uri="{FF2B5EF4-FFF2-40B4-BE49-F238E27FC236}">
-                <a16:creationId xmlns:a16="http://schemas.microsoft.com/office/drawing/2014/main" id="{E6EA53A3-FCAA-4120-AC91-0170901330E1}"/>
-              </a:ext>
-            </a:extLst>
-          </p:cNvPr>
-          <p:cNvPicPr>
-            <a:picLocks noChangeAspect="1"/>
-          </p:cNvPicPr>
-          <p:nvPr/>
-        </p:nvPicPr>
-        <p:blipFill>
-          <a:blip r:embed="rId2"/>
-          <a:stretch>
-            <a:fillRect/>
-          </a:stretch>
-        </p:blipFill>
-        <p:spPr>
-          <a:xfrm>
-            <a:off x="2369820" y="1606083"/>
-            <a:ext cx="6925788" cy="4541500"/>
-          </a:xfrm>
-          <a:prstGeom prst="rect">
-            <a:avLst/>
-          </a:prstGeom>
-        </p:spPr>
-      </p:pic>
-      <p:sp>
-        <p:nvSpPr>
-          <p:cNvPr id="6" name="Rectangle 5">
-            <a:extLst>
-              <a:ext uri="{FF2B5EF4-FFF2-40B4-BE49-F238E27FC236}">
-                <a16:creationId xmlns:a16="http://schemas.microsoft.com/office/drawing/2014/main" id="{77C5A18F-EAF8-41A3-A18C-86506A8B73FC}"/>
-              </a:ext>
-            </a:extLst>
-          </p:cNvPr>
-          <p:cNvSpPr/>
-          <p:nvPr/>
-        </p:nvSpPr>
-        <p:spPr>
-          <a:xfrm>
-            <a:off x="3602321" y="6308209"/>
-            <a:ext cx="824072" cy="369332"/>
-          </a:xfrm>
-          <a:prstGeom prst="rect">
-            <a:avLst/>
-          </a:prstGeom>
-        </p:spPr>
-        <p:txBody>
-          <a:bodyPr wrap="none">
-            <a:spAutoFit/>
-          </a:bodyPr>
-          <a:lstStyle/>
-          <a:p>
-            <a:r>
-              <a:rPr lang="en-US" dirty="0">
-                <a:hlinkClick r:id="rId3"/>
-              </a:rPr>
-              <a:t>Source</a:t>
-            </a:r>
-            <a:endParaRPr lang="en-US" dirty="0"/>
-          </a:p>
-        </p:txBody>
-      </p:sp>
-      <p:pic>
-        <p:nvPicPr>
-          <p:cNvPr id="2050" name="Picture 2" descr="IPUMS International">
-            <a:extLst>
-              <a:ext uri="{FF2B5EF4-FFF2-40B4-BE49-F238E27FC236}">
-                <a16:creationId xmlns:a16="http://schemas.microsoft.com/office/drawing/2014/main" id="{AD802C68-5C76-4123-9BF4-7D01C9945DF6}"/>
-              </a:ext>
-            </a:extLst>
-          </p:cNvPr>
-          <p:cNvPicPr>
-            <a:picLocks noChangeAspect="1" noChangeArrowheads="1"/>
-          </p:cNvPicPr>
-          <p:nvPr/>
-        </p:nvPicPr>
-        <p:blipFill>
-          <a:blip r:embed="rId4">
-            <a:extLst>
-              <a:ext uri="{28A0092B-C50C-407E-A947-70E740481C1C}">
-                <a14:useLocalDpi xmlns:a14="http://schemas.microsoft.com/office/drawing/2010/main" val="0"/>
-              </a:ext>
-            </a:extLst>
-          </a:blip>
-          <a:srcRect/>
-          <a:stretch>
-            <a:fillRect/>
-          </a:stretch>
-        </p:blipFill>
-        <p:spPr bwMode="auto">
-          <a:xfrm>
-            <a:off x="4705327" y="6279444"/>
-            <a:ext cx="2345567" cy="488448"/>
-          </a:xfrm>
-          <a:prstGeom prst="rect">
-            <a:avLst/>
-          </a:prstGeom>
-          <a:noFill/>
-          <a:extLst>
-            <a:ext uri="{909E8E84-426E-40DD-AFC4-6F175D3DCCD1}">
-              <a14:hiddenFill xmlns:a14="http://schemas.microsoft.com/office/drawing/2010/main">
-                <a:solidFill>
-                  <a:srgbClr val="FFFFFF"/>
-                </a:solidFill>
-              </a14:hiddenFill>
-            </a:ext>
-          </a:extLst>
-        </p:spPr>
-      </p:pic>
-    </p:spTree>
-    <p:extLst>
-      <p:ext uri="{BB962C8B-B14F-4D97-AF65-F5344CB8AC3E}">
-        <p14:creationId xmlns:p14="http://schemas.microsoft.com/office/powerpoint/2010/main" val="228490788"/>
-      </p:ext>
-    </p:extLst>
-  </p:cSld>
-  <p:clrMapOvr>
-    <a:masterClrMapping/>
-  </p:clrMapOvr>
-</p:sld>
-</file>
-
-<file path=ppt/slides/slide24.xml><?xml version="1.0" encoding="utf-8"?>
-<p:sld xmlns:a="http://schemas.openxmlformats.org/drawingml/2006/main" xmlns:r="http://schemas.openxmlformats.org/officeDocument/2006/relationships" xmlns:p="http://schemas.openxmlformats.org/presentationml/2006/main">
-  <p:cSld>
-    <p:spTree>
-      <p:nvGrpSpPr>
-        <p:cNvPr id="1" name=""/>
-        <p:cNvGrpSpPr/>
-        <p:nvPr/>
-      </p:nvGrpSpPr>
-      <p:grpSpPr>
-        <a:xfrm>
-          <a:off x="0" y="0"/>
-          <a:ext cx="0" cy="0"/>
-          <a:chOff x="0" y="0"/>
-          <a:chExt cx="0" cy="0"/>
-        </a:xfrm>
-      </p:grpSpPr>
-      <p:sp>
-        <p:nvSpPr>
-          <p:cNvPr id="3" name="Content Placeholder 2">
-            <a:extLst>
-              <a:ext uri="{FF2B5EF4-FFF2-40B4-BE49-F238E27FC236}">
-                <a16:creationId xmlns:a16="http://schemas.microsoft.com/office/drawing/2014/main" id="{ECE5AF47-0FFC-4B06-A56D-4BD0AE92A3B1}"/>
-              </a:ext>
-            </a:extLst>
-          </p:cNvPr>
-          <p:cNvSpPr>
-            <a:spLocks noGrp="1"/>
-          </p:cNvSpPr>
-          <p:nvPr>
-            <p:ph idx="1"/>
-          </p:nvPr>
-        </p:nvSpPr>
-        <p:spPr>
-          <a:xfrm>
-            <a:off x="838200" y="675249"/>
-            <a:ext cx="10515600" cy="5501714"/>
-          </a:xfrm>
-        </p:spPr>
-        <p:txBody>
-          <a:bodyPr/>
-          <a:lstStyle/>
-          <a:p>
-            <a:r>
-              <a:rPr lang="en-US" dirty="0"/>
-              <a:t>For each question, create a visualization that best answers the question:</a:t>
-            </a:r>
-          </a:p>
-          <a:p>
-            <a:endParaRPr lang="en-US" dirty="0"/>
-          </a:p>
-          <a:p>
-            <a:pPr marL="514350" indent="-514350">
-              <a:buAutoNum type="arabicPeriod"/>
-            </a:pPr>
-            <a:r>
-              <a:rPr lang="en-US" dirty="0"/>
-              <a:t>Characterize the change in the overall education of the U.S. population over time; is it becoming more or less educated?  Staying the same?</a:t>
-            </a:r>
-          </a:p>
-          <a:p>
-            <a:pPr marL="514350" indent="-514350">
-              <a:buAutoNum type="arabicPeriod"/>
-            </a:pPr>
-            <a:endParaRPr lang="en-US" dirty="0"/>
-          </a:p>
-          <a:p>
-            <a:pPr marL="514350" indent="-514350">
-              <a:buAutoNum type="arabicPeriod"/>
-            </a:pPr>
-            <a:r>
-              <a:rPr lang="en-US" dirty="0"/>
-              <a:t>Is the gender education gap widening  or narrowing?</a:t>
-            </a:r>
-          </a:p>
-          <a:p>
-            <a:pPr marL="514350" indent="-514350">
-              <a:buAutoNum type="arabicPeriod"/>
-            </a:pPr>
-            <a:endParaRPr lang="en-US" dirty="0"/>
-          </a:p>
-          <a:p>
-            <a:r>
-              <a:rPr lang="en-US" dirty="0"/>
-              <a:t> How do the approaches change if you are required to use </a:t>
-            </a:r>
-            <a:r>
-              <a:rPr lang="en-US" i="1" dirty="0"/>
-              <a:t>all the data </a:t>
-            </a:r>
-            <a:r>
-              <a:rPr lang="en-US" dirty="0"/>
-              <a:t>(no filtering/aggregating)?</a:t>
-            </a:r>
-          </a:p>
-        </p:txBody>
-      </p:sp>
-    </p:spTree>
-    <p:extLst>
-      <p:ext uri="{BB962C8B-B14F-4D97-AF65-F5344CB8AC3E}">
-        <p14:creationId xmlns:p14="http://schemas.microsoft.com/office/powerpoint/2010/main" val="2702869569"/>
-      </p:ext>
-    </p:extLst>
-  </p:cSld>
-  <p:clrMapOvr>
-    <a:masterClrMapping/>
-  </p:clrMapOvr>
-</p:sld>
-</file>
-
-<file path=ppt/slides/slide25.xml><?xml version="1.0" encoding="utf-8"?>
-<p:sld xmlns:a="http://schemas.openxmlformats.org/drawingml/2006/main" xmlns:r="http://schemas.openxmlformats.org/officeDocument/2006/relationships" xmlns:p="http://schemas.openxmlformats.org/presentationml/2006/main">
-  <p:cSld>
-    <p:spTree>
-      <p:nvGrpSpPr>
-        <p:cNvPr id="1" name=""/>
-        <p:cNvGrpSpPr/>
-        <p:nvPr/>
-      </p:nvGrpSpPr>
-      <p:grpSpPr>
-        <a:xfrm>
-          <a:off x="0" y="0"/>
-          <a:ext cx="0" cy="0"/>
-          <a:chOff x="0" y="0"/>
-          <a:chExt cx="0" cy="0"/>
-        </a:xfrm>
-      </p:grpSpPr>
-      <p:sp>
-        <p:nvSpPr>
-          <p:cNvPr id="2" name="Title 1">
-            <a:extLst>
-              <a:ext uri="{FF2B5EF4-FFF2-40B4-BE49-F238E27FC236}">
-                <a16:creationId xmlns:a16="http://schemas.microsoft.com/office/drawing/2014/main" id="{BD5BC30E-9115-4228-BA02-E0A9D318425C}"/>
-              </a:ext>
-            </a:extLst>
-          </p:cNvPr>
-          <p:cNvSpPr>
-            <a:spLocks noGrp="1"/>
-          </p:cNvSpPr>
-          <p:nvPr>
-            <p:ph type="title"/>
-          </p:nvPr>
-        </p:nvSpPr>
-        <p:spPr>
-          <a:xfrm>
-            <a:off x="831850" y="1709738"/>
-            <a:ext cx="10515600" cy="1164091"/>
-          </a:xfrm>
-        </p:spPr>
-        <p:txBody>
-          <a:bodyPr/>
-          <a:lstStyle/>
-          <a:p>
-            <a:r>
-              <a:rPr lang="en-US" dirty="0"/>
-              <a:t>Midterm project</a:t>
-            </a:r>
-          </a:p>
-        </p:txBody>
-      </p:sp>
-      <p:pic>
-        <p:nvPicPr>
-          <p:cNvPr id="1026" name="Picture 2" descr="Image result for police data challenge">
-            <a:extLst>
-              <a:ext uri="{FF2B5EF4-FFF2-40B4-BE49-F238E27FC236}">
-                <a16:creationId xmlns:a16="http://schemas.microsoft.com/office/drawing/2014/main" id="{942C1D60-2480-4BA4-8709-6F33B1E17266}"/>
-              </a:ext>
-            </a:extLst>
-          </p:cNvPr>
-          <p:cNvPicPr>
-            <a:picLocks noChangeAspect="1" noChangeArrowheads="1"/>
-          </p:cNvPicPr>
-          <p:nvPr/>
-        </p:nvPicPr>
-        <p:blipFill>
-          <a:blip r:embed="rId2">
-            <a:extLst>
-              <a:ext uri="{28A0092B-C50C-407E-A947-70E740481C1C}">
-                <a14:useLocalDpi xmlns:a14="http://schemas.microsoft.com/office/drawing/2010/main" val="0"/>
-              </a:ext>
-            </a:extLst>
-          </a:blip>
-          <a:srcRect/>
-          <a:stretch>
-            <a:fillRect/>
-          </a:stretch>
-        </p:blipFill>
-        <p:spPr bwMode="auto">
-          <a:xfrm>
-            <a:off x="627017" y="3454852"/>
-            <a:ext cx="4737464" cy="1454485"/>
-          </a:xfrm>
-          <a:prstGeom prst="rect">
-            <a:avLst/>
-          </a:prstGeom>
-          <a:noFill/>
-          <a:extLst>
-            <a:ext uri="{909E8E84-426E-40DD-AFC4-6F175D3DCCD1}">
-              <a14:hiddenFill xmlns:a14="http://schemas.microsoft.com/office/drawing/2010/main">
-                <a:solidFill>
-                  <a:srgbClr val="FFFFFF"/>
-                </a:solidFill>
-              </a14:hiddenFill>
-            </a:ext>
-          </a:extLst>
-        </p:spPr>
-      </p:pic>
-      <p:pic>
-        <p:nvPicPr>
-          <p:cNvPr id="1028" name="Picture 4" descr="Public Health Data Challenge">
-            <a:extLst>
-              <a:ext uri="{FF2B5EF4-FFF2-40B4-BE49-F238E27FC236}">
-                <a16:creationId xmlns:a16="http://schemas.microsoft.com/office/drawing/2014/main" id="{E65FB7AA-8E01-4EAA-8544-6A083A622A35}"/>
-              </a:ext>
-            </a:extLst>
-          </p:cNvPr>
-          <p:cNvPicPr>
-            <a:picLocks noChangeAspect="1" noChangeArrowheads="1"/>
-          </p:cNvPicPr>
-          <p:nvPr/>
-        </p:nvPicPr>
-        <p:blipFill>
-          <a:blip r:embed="rId3">
-            <a:extLst>
-              <a:ext uri="{28A0092B-C50C-407E-A947-70E740481C1C}">
-                <a14:useLocalDpi xmlns:a14="http://schemas.microsoft.com/office/drawing/2010/main" val="0"/>
-              </a:ext>
-            </a:extLst>
-          </a:blip>
-          <a:srcRect/>
-          <a:stretch>
-            <a:fillRect/>
-          </a:stretch>
-        </p:blipFill>
-        <p:spPr bwMode="auto">
-          <a:xfrm>
-            <a:off x="6505303" y="3429000"/>
-            <a:ext cx="4737464" cy="1454485"/>
-          </a:xfrm>
-          <a:prstGeom prst="rect">
-            <a:avLst/>
-          </a:prstGeom>
-          <a:noFill/>
-          <a:extLst>
-            <a:ext uri="{909E8E84-426E-40DD-AFC4-6F175D3DCCD1}">
-              <a14:hiddenFill xmlns:a14="http://schemas.microsoft.com/office/drawing/2010/main">
-                <a:solidFill>
-                  <a:srgbClr val="FFFFFF"/>
-                </a:solidFill>
-              </a14:hiddenFill>
-            </a:ext>
-          </a:extLst>
-        </p:spPr>
-      </p:pic>
-      <p:sp>
-        <p:nvSpPr>
-          <p:cNvPr id="4" name="Rectangle 3">
-            <a:extLst>
-              <a:ext uri="{FF2B5EF4-FFF2-40B4-BE49-F238E27FC236}">
-                <a16:creationId xmlns:a16="http://schemas.microsoft.com/office/drawing/2014/main" id="{78CE5CA8-B09D-460F-9C81-517955DE3A45}"/>
-              </a:ext>
-            </a:extLst>
-          </p:cNvPr>
-          <p:cNvSpPr/>
-          <p:nvPr/>
-        </p:nvSpPr>
-        <p:spPr>
-          <a:xfrm>
-            <a:off x="6314437" y="5305694"/>
-            <a:ext cx="5440144" cy="369332"/>
-          </a:xfrm>
-          <a:prstGeom prst="rect">
-            <a:avLst/>
-          </a:prstGeom>
-        </p:spPr>
-        <p:txBody>
-          <a:bodyPr wrap="none">
-            <a:spAutoFit/>
-          </a:bodyPr>
-          <a:lstStyle/>
-          <a:p>
-            <a:r>
-              <a:rPr lang="en-US" dirty="0">
-                <a:hlinkClick r:id="rId4"/>
-              </a:rPr>
-              <a:t>https://thisisstatistics.org/public-health-data-challenge/</a:t>
-            </a:r>
-            <a:endParaRPr lang="en-US" dirty="0"/>
-          </a:p>
-        </p:txBody>
-      </p:sp>
-      <p:sp>
-        <p:nvSpPr>
-          <p:cNvPr id="5" name="Rectangle 4">
-            <a:extLst>
-              <a:ext uri="{FF2B5EF4-FFF2-40B4-BE49-F238E27FC236}">
-                <a16:creationId xmlns:a16="http://schemas.microsoft.com/office/drawing/2014/main" id="{17FA2A53-2DF2-4AE4-A04C-66C6865BBE73}"/>
-              </a:ext>
-            </a:extLst>
-          </p:cNvPr>
-          <p:cNvSpPr/>
-          <p:nvPr/>
-        </p:nvSpPr>
-        <p:spPr>
-          <a:xfrm>
-            <a:off x="684443" y="5305694"/>
-            <a:ext cx="4622612" cy="369332"/>
-          </a:xfrm>
-          <a:prstGeom prst="rect">
-            <a:avLst/>
-          </a:prstGeom>
-        </p:spPr>
-        <p:txBody>
-          <a:bodyPr wrap="none">
-            <a:spAutoFit/>
-          </a:bodyPr>
-          <a:lstStyle/>
-          <a:p>
-            <a:r>
-              <a:rPr lang="en-US" dirty="0">
-                <a:hlinkClick r:id="rId5"/>
-              </a:rPr>
-              <a:t>https://thisisstatistics.org/policedatachallenge/</a:t>
-            </a:r>
-            <a:endParaRPr lang="en-US" dirty="0"/>
-          </a:p>
-        </p:txBody>
-      </p:sp>
-    </p:spTree>
-    <p:extLst>
-      <p:ext uri="{BB962C8B-B14F-4D97-AF65-F5344CB8AC3E}">
-        <p14:creationId xmlns:p14="http://schemas.microsoft.com/office/powerpoint/2010/main" val="2697546259"/>
-      </p:ext>
-    </p:extLst>
-  </p:cSld>
-  <p:clrMapOvr>
-    <a:masterClrMapping/>
-  </p:clrMapOvr>
-</p:sld>
-</file>
-
-<file path=ppt/slides/slide26.xml><?xml version="1.0" encoding="utf-8"?>
-<p:sld xmlns:a="http://schemas.openxmlformats.org/drawingml/2006/main" xmlns:r="http://schemas.openxmlformats.org/officeDocument/2006/relationships" xmlns:p="http://schemas.openxmlformats.org/presentationml/2006/main">
-  <p:cSld>
-    <p:spTree>
-      <p:nvGrpSpPr>
-        <p:cNvPr id="1" name=""/>
-        <p:cNvGrpSpPr/>
-        <p:nvPr/>
-      </p:nvGrpSpPr>
-      <p:grpSpPr>
-        <a:xfrm>
-          <a:off x="0" y="0"/>
-          <a:ext cx="0" cy="0"/>
-          <a:chOff x="0" y="0"/>
-          <a:chExt cx="0" cy="0"/>
-        </a:xfrm>
-      </p:grpSpPr>
-      <p:sp>
-        <p:nvSpPr>
-          <p:cNvPr id="2" name="Title 1">
-            <a:extLst>
-              <a:ext uri="{FF2B5EF4-FFF2-40B4-BE49-F238E27FC236}">
-                <a16:creationId xmlns:a16="http://schemas.microsoft.com/office/drawing/2014/main" id="{A1C28A1F-6F1A-4989-8875-C91E2ED56C24}"/>
-              </a:ext>
-            </a:extLst>
-          </p:cNvPr>
-          <p:cNvSpPr>
-            <a:spLocks noGrp="1"/>
-          </p:cNvSpPr>
-          <p:nvPr>
-            <p:ph type="title"/>
-          </p:nvPr>
-        </p:nvSpPr>
-        <p:spPr/>
-        <p:txBody>
-          <a:bodyPr/>
-          <a:lstStyle/>
-          <a:p>
-            <a:r>
-              <a:rPr lang="en-US" dirty="0"/>
-              <a:t>Final Project</a:t>
-            </a:r>
-          </a:p>
-        </p:txBody>
-      </p:sp>
-      <p:sp>
-        <p:nvSpPr>
-          <p:cNvPr id="3" name="Content Placeholder 2">
-            <a:extLst>
-              <a:ext uri="{FF2B5EF4-FFF2-40B4-BE49-F238E27FC236}">
-                <a16:creationId xmlns:a16="http://schemas.microsoft.com/office/drawing/2014/main" id="{B2B8A267-7516-4FD5-841E-BF3FC646A3FF}"/>
-              </a:ext>
-            </a:extLst>
-          </p:cNvPr>
-          <p:cNvSpPr>
-            <a:spLocks noGrp="1"/>
-          </p:cNvSpPr>
-          <p:nvPr>
-            <p:ph idx="1"/>
-          </p:nvPr>
-        </p:nvSpPr>
-        <p:spPr/>
-        <p:txBody>
-          <a:bodyPr/>
-          <a:lstStyle/>
-          <a:p>
-            <a:r>
-              <a:rPr lang="en-US" dirty="0"/>
-              <a:t>Students must find their own data</a:t>
-            </a:r>
-          </a:p>
-          <a:p>
-            <a:endParaRPr lang="en-US" dirty="0"/>
-          </a:p>
-          <a:p>
-            <a:r>
-              <a:rPr lang="en-US" dirty="0"/>
-              <a:t>Create “Visual Story”</a:t>
-            </a:r>
-          </a:p>
-          <a:p>
-            <a:endParaRPr lang="en-US" dirty="0"/>
-          </a:p>
-          <a:p>
-            <a:r>
-              <a:rPr lang="en-US" dirty="0"/>
-              <a:t>Presentation to class</a:t>
-            </a:r>
-          </a:p>
-        </p:txBody>
-      </p:sp>
-    </p:spTree>
-    <p:extLst>
-      <p:ext uri="{BB962C8B-B14F-4D97-AF65-F5344CB8AC3E}">
-        <p14:creationId xmlns:p14="http://schemas.microsoft.com/office/powerpoint/2010/main" val="1644304216"/>
-      </p:ext>
-    </p:extLst>
-  </p:cSld>
-  <p:clrMapOvr>
-    <a:masterClrMapping/>
-  </p:clrMapOvr>
-</p:sld>
-</file>
-
-<file path=ppt/slides/slide27.xml><?xml version="1.0" encoding="utf-8"?>
-<p:sld xmlns:a="http://schemas.openxmlformats.org/drawingml/2006/main" xmlns:r="http://schemas.openxmlformats.org/officeDocument/2006/relationships" xmlns:p="http://schemas.openxmlformats.org/presentationml/2006/main">
-  <p:cSld>
-    <p:spTree>
-      <p:nvGrpSpPr>
-        <p:cNvPr id="1" name=""/>
-        <p:cNvGrpSpPr/>
-        <p:nvPr/>
-      </p:nvGrpSpPr>
-      <p:grpSpPr>
-        <a:xfrm>
-          <a:off x="0" y="0"/>
-          <a:ext cx="0" cy="0"/>
-          <a:chOff x="0" y="0"/>
-          <a:chExt cx="0" cy="0"/>
-        </a:xfrm>
-      </p:grpSpPr>
-      <p:graphicFrame>
-        <p:nvGraphicFramePr>
-          <p:cNvPr id="2" name="Table 1">
-            <a:extLst>
-              <a:ext uri="{FF2B5EF4-FFF2-40B4-BE49-F238E27FC236}">
-                <a16:creationId xmlns:a16="http://schemas.microsoft.com/office/drawing/2014/main" id="{38FD4721-910B-4739-A251-D11F6485E534}"/>
-              </a:ext>
-            </a:extLst>
-          </p:cNvPr>
-          <p:cNvGraphicFramePr>
-            <a:graphicFrameLocks noGrp="1"/>
-          </p:cNvGraphicFramePr>
-          <p:nvPr/>
-        </p:nvGraphicFramePr>
-        <p:xfrm>
-          <a:off x="1099128" y="173520"/>
-          <a:ext cx="10427854" cy="6510959"/>
-        </p:xfrm>
-        <a:graphic>
-          <a:graphicData uri="http://schemas.openxmlformats.org/drawingml/2006/table">
-            <a:tbl>
-              <a:tblPr firstRow="1" firstCol="1" bandRow="1">
-                <a:tableStyleId>{5C22544A-7EE6-4342-B048-85BDC9FD1C3A}</a:tableStyleId>
-              </a:tblPr>
-              <a:tblGrid>
-                <a:gridCol w="2014679">
-                  <a:extLst>
-                    <a:ext uri="{9D8B030D-6E8A-4147-A177-3AD203B41FA5}">
-                      <a16:colId xmlns:a16="http://schemas.microsoft.com/office/drawing/2014/main" val="3584098861"/>
-                    </a:ext>
-                  </a:extLst>
-                </a:gridCol>
-                <a:gridCol w="2766709">
-                  <a:extLst>
-                    <a:ext uri="{9D8B030D-6E8A-4147-A177-3AD203B41FA5}">
-                      <a16:colId xmlns:a16="http://schemas.microsoft.com/office/drawing/2014/main" val="1469471892"/>
-                    </a:ext>
-                  </a:extLst>
-                </a:gridCol>
-                <a:gridCol w="2825150">
-                  <a:extLst>
-                    <a:ext uri="{9D8B030D-6E8A-4147-A177-3AD203B41FA5}">
-                      <a16:colId xmlns:a16="http://schemas.microsoft.com/office/drawing/2014/main" val="3135818386"/>
-                    </a:ext>
-                  </a:extLst>
-                </a:gridCol>
-                <a:gridCol w="2821316">
-                  <a:extLst>
-                    <a:ext uri="{9D8B030D-6E8A-4147-A177-3AD203B41FA5}">
-                      <a16:colId xmlns:a16="http://schemas.microsoft.com/office/drawing/2014/main" val="4061914172"/>
-                    </a:ext>
-                  </a:extLst>
-                </a:gridCol>
-              </a:tblGrid>
-              <a:tr h="150704">
-                <a:tc>
-                  <a:txBody>
-                    <a:bodyPr/>
-                    <a:lstStyle/>
-                    <a:p>
-                      <a:pPr marL="0" marR="0" algn="l">
-                        <a:lnSpc>
-                          <a:spcPct val="107000"/>
-                        </a:lnSpc>
-                        <a:spcBef>
-                          <a:spcPts val="0"/>
-                        </a:spcBef>
-                        <a:spcAft>
-                          <a:spcPts val="0"/>
-                        </a:spcAft>
-                      </a:pPr>
-                      <a:r>
-                        <a:rPr lang="en-US" sz="1800">
-                          <a:effectLst/>
-                        </a:rPr>
-                        <a:t> </a:t>
-                      </a:r>
-                      <a:endParaRPr lang="en-US" sz="1800">
-                        <a:effectLst/>
-                        <a:latin typeface="Calibri" panose="020F0502020204030204" pitchFamily="34" charset="0"/>
-                        <a:ea typeface="Calibri" panose="020F0502020204030204" pitchFamily="34" charset="0"/>
-                        <a:cs typeface="Times New Roman" panose="02020603050405020304" pitchFamily="18" charset="0"/>
-                      </a:endParaRPr>
-                    </a:p>
-                  </a:txBody>
-                  <a:tcPr marL="48143" marR="48143" marT="0" marB="0"/>
-                </a:tc>
-                <a:tc>
-                  <a:txBody>
-                    <a:bodyPr/>
-                    <a:lstStyle/>
-                    <a:p>
-                      <a:pPr marL="0" marR="0" algn="ctr">
-                        <a:lnSpc>
-                          <a:spcPct val="107000"/>
-                        </a:lnSpc>
-                        <a:spcBef>
-                          <a:spcPts val="0"/>
-                        </a:spcBef>
-                        <a:spcAft>
-                          <a:spcPts val="0"/>
-                        </a:spcAft>
-                      </a:pPr>
-                      <a:r>
-                        <a:rPr lang="en-US" sz="1800" dirty="0">
-                          <a:effectLst/>
-                        </a:rPr>
-                        <a:t>Complete: 3</a:t>
-                      </a:r>
-                      <a:endParaRPr lang="en-US" sz="1800" dirty="0">
-                        <a:effectLst/>
-                        <a:latin typeface="Calibri" panose="020F0502020204030204" pitchFamily="34" charset="0"/>
-                        <a:ea typeface="Calibri" panose="020F0502020204030204" pitchFamily="34" charset="0"/>
-                        <a:cs typeface="Times New Roman" panose="02020603050405020304" pitchFamily="18" charset="0"/>
-                      </a:endParaRPr>
-                    </a:p>
-                  </a:txBody>
-                  <a:tcPr marL="48143" marR="48143" marT="0" marB="0"/>
-                </a:tc>
-                <a:tc>
-                  <a:txBody>
-                    <a:bodyPr/>
-                    <a:lstStyle/>
-                    <a:p>
-                      <a:pPr marL="0" marR="0" algn="ctr">
-                        <a:lnSpc>
-                          <a:spcPct val="107000"/>
-                        </a:lnSpc>
-                        <a:spcBef>
-                          <a:spcPts val="0"/>
-                        </a:spcBef>
-                        <a:spcAft>
-                          <a:spcPts val="0"/>
-                        </a:spcAft>
-                      </a:pPr>
-                      <a:r>
-                        <a:rPr lang="en-US" sz="1800" dirty="0">
-                          <a:effectLst/>
-                        </a:rPr>
-                        <a:t>Developing: 2</a:t>
-                      </a:r>
-                      <a:endParaRPr lang="en-US" sz="1800" dirty="0">
-                        <a:effectLst/>
-                        <a:latin typeface="Calibri" panose="020F0502020204030204" pitchFamily="34" charset="0"/>
-                        <a:ea typeface="Calibri" panose="020F0502020204030204" pitchFamily="34" charset="0"/>
-                        <a:cs typeface="Times New Roman" panose="02020603050405020304" pitchFamily="18" charset="0"/>
-                      </a:endParaRPr>
-                    </a:p>
-                  </a:txBody>
-                  <a:tcPr marL="48143" marR="48143" marT="0" marB="0"/>
-                </a:tc>
-                <a:tc>
-                  <a:txBody>
-                    <a:bodyPr/>
-                    <a:lstStyle/>
-                    <a:p>
-                      <a:pPr marL="0" marR="0" algn="ctr">
-                        <a:lnSpc>
-                          <a:spcPct val="107000"/>
-                        </a:lnSpc>
-                        <a:spcBef>
-                          <a:spcPts val="0"/>
-                        </a:spcBef>
-                        <a:spcAft>
-                          <a:spcPts val="0"/>
-                        </a:spcAft>
-                      </a:pPr>
-                      <a:r>
-                        <a:rPr lang="en-US" sz="1800" dirty="0">
-                          <a:effectLst/>
-                        </a:rPr>
-                        <a:t>Minimal: 1</a:t>
-                      </a:r>
-                      <a:endParaRPr lang="en-US" sz="1800" dirty="0">
-                        <a:effectLst/>
-                        <a:latin typeface="Calibri" panose="020F0502020204030204" pitchFamily="34" charset="0"/>
-                        <a:ea typeface="Calibri" panose="020F0502020204030204" pitchFamily="34" charset="0"/>
-                        <a:cs typeface="Times New Roman" panose="02020603050405020304" pitchFamily="18" charset="0"/>
-                      </a:endParaRPr>
-                    </a:p>
-                  </a:txBody>
-                  <a:tcPr marL="48143" marR="48143" marT="0" marB="0"/>
-                </a:tc>
-                <a:extLst>
-                  <a:ext uri="{0D108BD9-81ED-4DB2-BD59-A6C34878D82A}">
-                    <a16:rowId xmlns:a16="http://schemas.microsoft.com/office/drawing/2014/main" val="3693145928"/>
-                  </a:ext>
-                </a:extLst>
-              </a:tr>
-              <a:tr h="623536">
-                <a:tc>
-                  <a:txBody>
-                    <a:bodyPr/>
-                    <a:lstStyle/>
-                    <a:p>
-                      <a:pPr marL="0" marR="0" algn="l">
-                        <a:lnSpc>
-                          <a:spcPct val="107000"/>
-                        </a:lnSpc>
-                        <a:spcBef>
-                          <a:spcPts val="0"/>
-                        </a:spcBef>
-                        <a:spcAft>
-                          <a:spcPts val="0"/>
-                        </a:spcAft>
-                      </a:pPr>
-                      <a:r>
-                        <a:rPr lang="en-US" sz="1800" dirty="0">
-                          <a:effectLst/>
-                        </a:rPr>
-                        <a:t>1. Data source(s)</a:t>
-                      </a:r>
-                      <a:endParaRPr lang="en-US" sz="1800" dirty="0">
-                        <a:effectLst/>
-                        <a:latin typeface="Calibri" panose="020F0502020204030204" pitchFamily="34" charset="0"/>
-                        <a:ea typeface="Calibri" panose="020F0502020204030204" pitchFamily="34" charset="0"/>
-                        <a:cs typeface="Times New Roman" panose="02020603050405020304" pitchFamily="18" charset="0"/>
-                      </a:endParaRPr>
-                    </a:p>
-                  </a:txBody>
-                  <a:tcPr marL="48143" marR="48143" marT="0" marB="0"/>
-                </a:tc>
-                <a:tc>
-                  <a:txBody>
-                    <a:bodyPr/>
-                    <a:lstStyle/>
-                    <a:p>
-                      <a:pPr marL="0" marR="0" algn="l">
-                        <a:lnSpc>
-                          <a:spcPct val="107000"/>
-                        </a:lnSpc>
-                        <a:spcBef>
-                          <a:spcPts val="0"/>
-                        </a:spcBef>
-                        <a:spcAft>
-                          <a:spcPts val="0"/>
-                        </a:spcAft>
-                      </a:pPr>
-                      <a:r>
-                        <a:rPr lang="en-US" sz="1200">
-                          <a:effectLst/>
-                        </a:rPr>
-                        <a:t>The data sources visualized are very rich, and required some effort to pre-process.</a:t>
-                      </a:r>
-                      <a:endParaRPr lang="en-US" sz="1200">
-                        <a:effectLst/>
-                        <a:latin typeface="Calibri" panose="020F0502020204030204" pitchFamily="34" charset="0"/>
-                        <a:ea typeface="Calibri" panose="020F0502020204030204" pitchFamily="34" charset="0"/>
-                        <a:cs typeface="Times New Roman" panose="02020603050405020304" pitchFamily="18" charset="0"/>
-                      </a:endParaRPr>
-                    </a:p>
-                  </a:txBody>
-                  <a:tcPr marL="48143" marR="48143" marT="0" marB="0"/>
-                </a:tc>
-                <a:tc>
-                  <a:txBody>
-                    <a:bodyPr/>
-                    <a:lstStyle/>
-                    <a:p>
-                      <a:pPr marL="0" marR="0" algn="l">
-                        <a:lnSpc>
-                          <a:spcPct val="107000"/>
-                        </a:lnSpc>
-                        <a:spcBef>
-                          <a:spcPts val="0"/>
-                        </a:spcBef>
-                        <a:spcAft>
-                          <a:spcPts val="0"/>
-                        </a:spcAft>
-                      </a:pPr>
-                      <a:r>
-                        <a:rPr lang="en-US" sz="1200">
-                          <a:effectLst/>
-                        </a:rPr>
-                        <a:t>The data sources visualized are somewhat rich, and/or required minimal effort to pre-process.</a:t>
-                      </a:r>
-                      <a:endParaRPr lang="en-US" sz="1200">
-                        <a:effectLst/>
-                        <a:latin typeface="Calibri" panose="020F0502020204030204" pitchFamily="34" charset="0"/>
-                        <a:ea typeface="Calibri" panose="020F0502020204030204" pitchFamily="34" charset="0"/>
-                        <a:cs typeface="Times New Roman" panose="02020603050405020304" pitchFamily="18" charset="0"/>
-                      </a:endParaRPr>
-                    </a:p>
-                  </a:txBody>
-                  <a:tcPr marL="48143" marR="48143" marT="0" marB="0"/>
-                </a:tc>
-                <a:tc>
-                  <a:txBody>
-                    <a:bodyPr/>
-                    <a:lstStyle/>
-                    <a:p>
-                      <a:pPr marL="0" marR="0" algn="l">
-                        <a:lnSpc>
-                          <a:spcPct val="107000"/>
-                        </a:lnSpc>
-                        <a:spcBef>
-                          <a:spcPts val="0"/>
-                        </a:spcBef>
-                        <a:spcAft>
-                          <a:spcPts val="0"/>
-                        </a:spcAft>
-                      </a:pPr>
-                      <a:r>
-                        <a:rPr lang="en-US" sz="1200">
-                          <a:effectLst/>
-                        </a:rPr>
-                        <a:t>The data sources are quite shallow, and/or little effort was made to pre-process.</a:t>
-                      </a:r>
-                      <a:endParaRPr lang="en-US" sz="1200">
-                        <a:effectLst/>
-                        <a:latin typeface="Calibri" panose="020F0502020204030204" pitchFamily="34" charset="0"/>
-                        <a:ea typeface="Calibri" panose="020F0502020204030204" pitchFamily="34" charset="0"/>
-                        <a:cs typeface="Times New Roman" panose="02020603050405020304" pitchFamily="18" charset="0"/>
-                      </a:endParaRPr>
-                    </a:p>
-                  </a:txBody>
-                  <a:tcPr marL="48143" marR="48143" marT="0" marB="0"/>
-                </a:tc>
-                <a:extLst>
-                  <a:ext uri="{0D108BD9-81ED-4DB2-BD59-A6C34878D82A}">
-                    <a16:rowId xmlns:a16="http://schemas.microsoft.com/office/drawing/2014/main" val="486929332"/>
-                  </a:ext>
-                </a:extLst>
-              </a:tr>
-              <a:tr h="465925">
-                <a:tc>
-                  <a:txBody>
-                    <a:bodyPr/>
-                    <a:lstStyle/>
-                    <a:p>
-                      <a:pPr marL="0" marR="0" algn="l">
-                        <a:lnSpc>
-                          <a:spcPct val="107000"/>
-                        </a:lnSpc>
-                        <a:spcBef>
-                          <a:spcPts val="0"/>
-                        </a:spcBef>
-                        <a:spcAft>
-                          <a:spcPts val="0"/>
-                        </a:spcAft>
-                      </a:pPr>
-                      <a:r>
-                        <a:rPr lang="en-US" sz="1800">
-                          <a:effectLst/>
-                        </a:rPr>
-                        <a:t>2. Questions</a:t>
-                      </a:r>
-                      <a:endParaRPr lang="en-US" sz="1800">
-                        <a:effectLst/>
-                        <a:latin typeface="Calibri" panose="020F0502020204030204" pitchFamily="34" charset="0"/>
-                        <a:ea typeface="Calibri" panose="020F0502020204030204" pitchFamily="34" charset="0"/>
-                        <a:cs typeface="Times New Roman" panose="02020603050405020304" pitchFamily="18" charset="0"/>
-                      </a:endParaRPr>
-                    </a:p>
-                  </a:txBody>
-                  <a:tcPr marL="48143" marR="48143" marT="0" marB="0"/>
-                </a:tc>
-                <a:tc>
-                  <a:txBody>
-                    <a:bodyPr/>
-                    <a:lstStyle/>
-                    <a:p>
-                      <a:pPr marL="0" marR="0" algn="l">
-                        <a:lnSpc>
-                          <a:spcPct val="107000"/>
-                        </a:lnSpc>
-                        <a:spcBef>
-                          <a:spcPts val="0"/>
-                        </a:spcBef>
-                        <a:spcAft>
-                          <a:spcPts val="0"/>
-                        </a:spcAft>
-                      </a:pPr>
-                      <a:r>
-                        <a:rPr lang="en-US" sz="1200">
-                          <a:effectLst/>
-                        </a:rPr>
-                        <a:t>All questions posed on introductory dashboard are answered.</a:t>
-                      </a:r>
-                      <a:endParaRPr lang="en-US" sz="1200">
-                        <a:effectLst/>
-                        <a:latin typeface="Calibri" panose="020F0502020204030204" pitchFamily="34" charset="0"/>
-                        <a:ea typeface="Calibri" panose="020F0502020204030204" pitchFamily="34" charset="0"/>
-                        <a:cs typeface="Times New Roman" panose="02020603050405020304" pitchFamily="18" charset="0"/>
-                      </a:endParaRPr>
-                    </a:p>
-                  </a:txBody>
-                  <a:tcPr marL="48143" marR="48143" marT="0" marB="0"/>
-                </a:tc>
-                <a:tc>
-                  <a:txBody>
-                    <a:bodyPr/>
-                    <a:lstStyle/>
-                    <a:p>
-                      <a:pPr marL="0" marR="0" algn="l">
-                        <a:lnSpc>
-                          <a:spcPct val="107000"/>
-                        </a:lnSpc>
-                        <a:spcBef>
-                          <a:spcPts val="0"/>
-                        </a:spcBef>
-                        <a:spcAft>
-                          <a:spcPts val="0"/>
-                        </a:spcAft>
-                      </a:pPr>
-                      <a:r>
-                        <a:rPr lang="en-US" sz="1200">
-                          <a:effectLst/>
-                        </a:rPr>
-                        <a:t>Most questions posed on introductory dashboard are answered.</a:t>
-                      </a:r>
-                      <a:endParaRPr lang="en-US" sz="1200">
-                        <a:effectLst/>
-                        <a:latin typeface="Calibri" panose="020F0502020204030204" pitchFamily="34" charset="0"/>
-                        <a:ea typeface="Calibri" panose="020F0502020204030204" pitchFamily="34" charset="0"/>
-                        <a:cs typeface="Times New Roman" panose="02020603050405020304" pitchFamily="18" charset="0"/>
-                      </a:endParaRPr>
-                    </a:p>
-                  </a:txBody>
-                  <a:tcPr marL="48143" marR="48143" marT="0" marB="0"/>
-                </a:tc>
-                <a:tc>
-                  <a:txBody>
-                    <a:bodyPr/>
-                    <a:lstStyle/>
-                    <a:p>
-                      <a:pPr marL="0" marR="0" algn="l">
-                        <a:lnSpc>
-                          <a:spcPct val="107000"/>
-                        </a:lnSpc>
-                        <a:spcBef>
-                          <a:spcPts val="0"/>
-                        </a:spcBef>
-                        <a:spcAft>
-                          <a:spcPts val="0"/>
-                        </a:spcAft>
-                      </a:pPr>
-                      <a:r>
-                        <a:rPr lang="en-US" sz="1200">
-                          <a:effectLst/>
-                        </a:rPr>
-                        <a:t>Few questions posed on introductory dashboard are answered.</a:t>
-                      </a:r>
-                      <a:endParaRPr lang="en-US" sz="1200">
-                        <a:effectLst/>
-                        <a:latin typeface="Calibri" panose="020F0502020204030204" pitchFamily="34" charset="0"/>
-                        <a:ea typeface="Calibri" panose="020F0502020204030204" pitchFamily="34" charset="0"/>
-                        <a:cs typeface="Times New Roman" panose="02020603050405020304" pitchFamily="18" charset="0"/>
-                      </a:endParaRPr>
-                    </a:p>
-                  </a:txBody>
-                  <a:tcPr marL="48143" marR="48143" marT="0" marB="0"/>
-                </a:tc>
-                <a:extLst>
-                  <a:ext uri="{0D108BD9-81ED-4DB2-BD59-A6C34878D82A}">
-                    <a16:rowId xmlns:a16="http://schemas.microsoft.com/office/drawing/2014/main" val="707091247"/>
-                  </a:ext>
-                </a:extLst>
-              </a:tr>
-              <a:tr h="623536">
-                <a:tc>
-                  <a:txBody>
-                    <a:bodyPr/>
-                    <a:lstStyle/>
-                    <a:p>
-                      <a:pPr marL="0" marR="0" algn="l">
-                        <a:lnSpc>
-                          <a:spcPct val="107000"/>
-                        </a:lnSpc>
-                        <a:spcBef>
-                          <a:spcPts val="0"/>
-                        </a:spcBef>
-                        <a:spcAft>
-                          <a:spcPts val="0"/>
-                        </a:spcAft>
-                      </a:pPr>
-                      <a:r>
-                        <a:rPr lang="en-US" sz="1800">
-                          <a:effectLst/>
-                        </a:rPr>
-                        <a:t>3. Message clarity</a:t>
-                      </a:r>
-                      <a:r>
-                        <a:rPr lang="en-US" sz="1800" baseline="30000">
-                          <a:effectLst/>
-                        </a:rPr>
-                        <a:t>†</a:t>
-                      </a:r>
-                      <a:r>
-                        <a:rPr lang="en-US" sz="1800">
-                          <a:effectLst/>
-                        </a:rPr>
-                        <a:t> </a:t>
-                      </a:r>
-                      <a:endParaRPr lang="en-US" sz="1800">
-                        <a:effectLst/>
-                        <a:latin typeface="Calibri" panose="020F0502020204030204" pitchFamily="34" charset="0"/>
-                        <a:ea typeface="Calibri" panose="020F0502020204030204" pitchFamily="34" charset="0"/>
-                        <a:cs typeface="Times New Roman" panose="02020603050405020304" pitchFamily="18" charset="0"/>
-                      </a:endParaRPr>
-                    </a:p>
-                  </a:txBody>
-                  <a:tcPr marL="48143" marR="48143" marT="0" marB="0"/>
-                </a:tc>
-                <a:tc>
-                  <a:txBody>
-                    <a:bodyPr/>
-                    <a:lstStyle/>
-                    <a:p>
-                      <a:pPr marL="0" marR="0" algn="l">
-                        <a:lnSpc>
-                          <a:spcPct val="107000"/>
-                        </a:lnSpc>
-                        <a:spcBef>
-                          <a:spcPts val="0"/>
-                        </a:spcBef>
-                        <a:spcAft>
-                          <a:spcPts val="0"/>
-                        </a:spcAft>
-                      </a:pPr>
-                      <a:r>
-                        <a:rPr lang="en-US" sz="1200">
-                          <a:effectLst/>
-                        </a:rPr>
-                        <a:t>The intended messages and relevant comparisons of all visualizations are obvious</a:t>
-                      </a:r>
-                      <a:endParaRPr lang="en-US" sz="1200">
-                        <a:effectLst/>
-                        <a:latin typeface="Calibri" panose="020F0502020204030204" pitchFamily="34" charset="0"/>
-                        <a:ea typeface="Calibri" panose="020F0502020204030204" pitchFamily="34" charset="0"/>
-                        <a:cs typeface="Times New Roman" panose="02020603050405020304" pitchFamily="18" charset="0"/>
-                      </a:endParaRPr>
-                    </a:p>
-                  </a:txBody>
-                  <a:tcPr marL="48143" marR="48143" marT="0" marB="0"/>
-                </a:tc>
-                <a:tc>
-                  <a:txBody>
-                    <a:bodyPr/>
-                    <a:lstStyle/>
-                    <a:p>
-                      <a:pPr marL="0" marR="0" algn="l">
-                        <a:lnSpc>
-                          <a:spcPct val="107000"/>
-                        </a:lnSpc>
-                        <a:spcBef>
-                          <a:spcPts val="0"/>
-                        </a:spcBef>
-                        <a:spcAft>
-                          <a:spcPts val="0"/>
-                        </a:spcAft>
-                      </a:pPr>
-                      <a:r>
-                        <a:rPr lang="en-US" sz="1200">
-                          <a:effectLst/>
-                        </a:rPr>
-                        <a:t>The intended messages and relevant comparisons of most visualizations are obvious</a:t>
-                      </a:r>
-                      <a:endParaRPr lang="en-US" sz="1200">
-                        <a:effectLst/>
-                        <a:latin typeface="Calibri" panose="020F0502020204030204" pitchFamily="34" charset="0"/>
-                        <a:ea typeface="Calibri" panose="020F0502020204030204" pitchFamily="34" charset="0"/>
-                        <a:cs typeface="Times New Roman" panose="02020603050405020304" pitchFamily="18" charset="0"/>
-                      </a:endParaRPr>
-                    </a:p>
-                  </a:txBody>
-                  <a:tcPr marL="48143" marR="48143" marT="0" marB="0"/>
-                </a:tc>
-                <a:tc>
-                  <a:txBody>
-                    <a:bodyPr/>
-                    <a:lstStyle/>
-                    <a:p>
-                      <a:pPr marL="0" marR="0" algn="l">
-                        <a:lnSpc>
-                          <a:spcPct val="107000"/>
-                        </a:lnSpc>
-                        <a:spcBef>
-                          <a:spcPts val="0"/>
-                        </a:spcBef>
-                        <a:spcAft>
-                          <a:spcPts val="0"/>
-                        </a:spcAft>
-                      </a:pPr>
-                      <a:r>
-                        <a:rPr lang="en-US" sz="1200">
-                          <a:effectLst/>
-                        </a:rPr>
-                        <a:t>Few visualizations have obvious messages or relevant comparisons</a:t>
-                      </a:r>
-                      <a:endParaRPr lang="en-US" sz="1200">
-                        <a:effectLst/>
-                        <a:latin typeface="Calibri" panose="020F0502020204030204" pitchFamily="34" charset="0"/>
-                        <a:ea typeface="Calibri" panose="020F0502020204030204" pitchFamily="34" charset="0"/>
-                        <a:cs typeface="Times New Roman" panose="02020603050405020304" pitchFamily="18" charset="0"/>
-                      </a:endParaRPr>
-                    </a:p>
-                  </a:txBody>
-                  <a:tcPr marL="48143" marR="48143" marT="0" marB="0"/>
-                </a:tc>
-                <a:extLst>
-                  <a:ext uri="{0D108BD9-81ED-4DB2-BD59-A6C34878D82A}">
-                    <a16:rowId xmlns:a16="http://schemas.microsoft.com/office/drawing/2014/main" val="1588904523"/>
-                  </a:ext>
-                </a:extLst>
-              </a:tr>
-              <a:tr h="465925">
-                <a:tc>
-                  <a:txBody>
-                    <a:bodyPr/>
-                    <a:lstStyle/>
-                    <a:p>
-                      <a:pPr marL="0" marR="0" algn="l">
-                        <a:lnSpc>
-                          <a:spcPct val="107000"/>
-                        </a:lnSpc>
-                        <a:spcBef>
-                          <a:spcPts val="0"/>
-                        </a:spcBef>
-                        <a:spcAft>
-                          <a:spcPts val="0"/>
-                        </a:spcAft>
-                      </a:pPr>
-                      <a:r>
-                        <a:rPr lang="en-US" sz="1800">
-                          <a:effectLst/>
-                        </a:rPr>
-                        <a:t>4. Effective comparisons</a:t>
-                      </a:r>
-                      <a:endParaRPr lang="en-US" sz="1800">
-                        <a:effectLst/>
-                        <a:latin typeface="Calibri" panose="020F0502020204030204" pitchFamily="34" charset="0"/>
-                        <a:ea typeface="Calibri" panose="020F0502020204030204" pitchFamily="34" charset="0"/>
-                        <a:cs typeface="Times New Roman" panose="02020603050405020304" pitchFamily="18" charset="0"/>
-                      </a:endParaRPr>
-                    </a:p>
-                  </a:txBody>
-                  <a:tcPr marL="48143" marR="48143" marT="0" marB="0"/>
-                </a:tc>
-                <a:tc>
-                  <a:txBody>
-                    <a:bodyPr/>
-                    <a:lstStyle/>
-                    <a:p>
-                      <a:pPr marL="0" marR="0" algn="l">
-                        <a:lnSpc>
-                          <a:spcPct val="107000"/>
-                        </a:lnSpc>
-                        <a:spcBef>
-                          <a:spcPts val="0"/>
-                        </a:spcBef>
-                        <a:spcAft>
-                          <a:spcPts val="0"/>
-                        </a:spcAft>
-                      </a:pPr>
-                      <a:r>
-                        <a:rPr lang="en-US" sz="1200">
-                          <a:effectLst/>
-                        </a:rPr>
-                        <a:t>The most important comparisons are always easy to make.</a:t>
-                      </a:r>
-                      <a:endParaRPr lang="en-US" sz="1200">
-                        <a:effectLst/>
-                        <a:latin typeface="Calibri" panose="020F0502020204030204" pitchFamily="34" charset="0"/>
-                        <a:ea typeface="Calibri" panose="020F0502020204030204" pitchFamily="34" charset="0"/>
-                        <a:cs typeface="Times New Roman" panose="02020603050405020304" pitchFamily="18" charset="0"/>
-                      </a:endParaRPr>
-                    </a:p>
-                  </a:txBody>
-                  <a:tcPr marL="48143" marR="48143" marT="0" marB="0"/>
-                </a:tc>
-                <a:tc>
-                  <a:txBody>
-                    <a:bodyPr/>
-                    <a:lstStyle/>
-                    <a:p>
-                      <a:pPr marL="0" marR="0" algn="l">
-                        <a:lnSpc>
-                          <a:spcPct val="107000"/>
-                        </a:lnSpc>
-                        <a:spcBef>
-                          <a:spcPts val="0"/>
-                        </a:spcBef>
-                        <a:spcAft>
-                          <a:spcPts val="0"/>
-                        </a:spcAft>
-                      </a:pPr>
-                      <a:r>
-                        <a:rPr lang="en-US" sz="1200">
-                          <a:effectLst/>
-                        </a:rPr>
-                        <a:t>The most important comparisons are not always easy to make.</a:t>
-                      </a:r>
-                      <a:endParaRPr lang="en-US" sz="1200">
-                        <a:effectLst/>
-                        <a:latin typeface="Calibri" panose="020F0502020204030204" pitchFamily="34" charset="0"/>
-                        <a:ea typeface="Calibri" panose="020F0502020204030204" pitchFamily="34" charset="0"/>
-                        <a:cs typeface="Times New Roman" panose="02020603050405020304" pitchFamily="18" charset="0"/>
-                      </a:endParaRPr>
-                    </a:p>
-                  </a:txBody>
-                  <a:tcPr marL="48143" marR="48143" marT="0" marB="0"/>
-                </a:tc>
-                <a:tc>
-                  <a:txBody>
-                    <a:bodyPr/>
-                    <a:lstStyle/>
-                    <a:p>
-                      <a:pPr marL="0" marR="0" algn="l">
-                        <a:lnSpc>
-                          <a:spcPct val="107000"/>
-                        </a:lnSpc>
-                        <a:spcBef>
-                          <a:spcPts val="0"/>
-                        </a:spcBef>
-                        <a:spcAft>
-                          <a:spcPts val="0"/>
-                        </a:spcAft>
-                      </a:pPr>
-                      <a:r>
-                        <a:rPr lang="en-US" sz="1200">
-                          <a:effectLst/>
-                        </a:rPr>
-                        <a:t>Few of the most important comparisons are easy to make.</a:t>
-                      </a:r>
-                      <a:endParaRPr lang="en-US" sz="1200">
-                        <a:effectLst/>
-                        <a:latin typeface="Calibri" panose="020F0502020204030204" pitchFamily="34" charset="0"/>
-                        <a:ea typeface="Calibri" panose="020F0502020204030204" pitchFamily="34" charset="0"/>
-                        <a:cs typeface="Times New Roman" panose="02020603050405020304" pitchFamily="18" charset="0"/>
-                      </a:endParaRPr>
-                    </a:p>
-                  </a:txBody>
-                  <a:tcPr marL="48143" marR="48143" marT="0" marB="0"/>
-                </a:tc>
-                <a:extLst>
-                  <a:ext uri="{0D108BD9-81ED-4DB2-BD59-A6C34878D82A}">
-                    <a16:rowId xmlns:a16="http://schemas.microsoft.com/office/drawing/2014/main" val="2411707736"/>
-                  </a:ext>
-                </a:extLst>
-              </a:tr>
-              <a:tr h="623536">
-                <a:tc>
-                  <a:txBody>
-                    <a:bodyPr/>
-                    <a:lstStyle/>
-                    <a:p>
-                      <a:pPr marL="0" marR="0" algn="l">
-                        <a:lnSpc>
-                          <a:spcPct val="107000"/>
-                        </a:lnSpc>
-                        <a:spcBef>
-                          <a:spcPts val="0"/>
-                        </a:spcBef>
-                        <a:spcAft>
-                          <a:spcPts val="0"/>
-                        </a:spcAft>
-                      </a:pPr>
-                      <a:r>
-                        <a:rPr lang="en-US" sz="1800">
-                          <a:effectLst/>
-                        </a:rPr>
-                        <a:t>5. Tidiness</a:t>
-                      </a:r>
-                      <a:endParaRPr lang="en-US" sz="1800">
-                        <a:effectLst/>
-                        <a:latin typeface="Calibri" panose="020F0502020204030204" pitchFamily="34" charset="0"/>
-                        <a:ea typeface="Calibri" panose="020F0502020204030204" pitchFamily="34" charset="0"/>
-                        <a:cs typeface="Times New Roman" panose="02020603050405020304" pitchFamily="18" charset="0"/>
-                      </a:endParaRPr>
-                    </a:p>
-                  </a:txBody>
-                  <a:tcPr marL="48143" marR="48143" marT="0" marB="0"/>
-                </a:tc>
-                <a:tc>
-                  <a:txBody>
-                    <a:bodyPr/>
-                    <a:lstStyle/>
-                    <a:p>
-                      <a:pPr marL="0" marR="0" algn="l">
-                        <a:lnSpc>
-                          <a:spcPct val="107000"/>
-                        </a:lnSpc>
-                        <a:spcBef>
-                          <a:spcPts val="0"/>
-                        </a:spcBef>
-                        <a:spcAft>
-                          <a:spcPts val="0"/>
-                        </a:spcAft>
-                      </a:pPr>
-                      <a:r>
-                        <a:rPr lang="en-US" sz="1200" dirty="0">
-                          <a:effectLst/>
-                        </a:rPr>
-                        <a:t>All visualizations show only relevant data features; all visualizations are not “cluttered.”</a:t>
-                      </a:r>
-                      <a:endParaRPr lang="en-US" sz="1200" dirty="0">
-                        <a:effectLst/>
-                        <a:latin typeface="Calibri" panose="020F0502020204030204" pitchFamily="34" charset="0"/>
-                        <a:ea typeface="Calibri" panose="020F0502020204030204" pitchFamily="34" charset="0"/>
-                        <a:cs typeface="Times New Roman" panose="02020603050405020304" pitchFamily="18" charset="0"/>
-                      </a:endParaRPr>
-                    </a:p>
-                  </a:txBody>
-                  <a:tcPr marL="48143" marR="48143" marT="0" marB="0"/>
-                </a:tc>
-                <a:tc>
-                  <a:txBody>
-                    <a:bodyPr/>
-                    <a:lstStyle/>
-                    <a:p>
-                      <a:pPr marL="0" marR="0" algn="l">
-                        <a:lnSpc>
-                          <a:spcPct val="107000"/>
-                        </a:lnSpc>
-                        <a:spcBef>
-                          <a:spcPts val="0"/>
-                        </a:spcBef>
-                        <a:spcAft>
-                          <a:spcPts val="0"/>
-                        </a:spcAft>
-                      </a:pPr>
-                      <a:r>
-                        <a:rPr lang="en-US" sz="1200">
-                          <a:effectLst/>
-                        </a:rPr>
-                        <a:t>Most visualizations show only relevant data features; some visualizations are not “cluttered.”</a:t>
-                      </a:r>
-                      <a:endParaRPr lang="en-US" sz="1200">
-                        <a:effectLst/>
-                        <a:latin typeface="Calibri" panose="020F0502020204030204" pitchFamily="34" charset="0"/>
-                        <a:ea typeface="Calibri" panose="020F0502020204030204" pitchFamily="34" charset="0"/>
-                        <a:cs typeface="Times New Roman" panose="02020603050405020304" pitchFamily="18" charset="0"/>
-                      </a:endParaRPr>
-                    </a:p>
-                  </a:txBody>
-                  <a:tcPr marL="48143" marR="48143" marT="0" marB="0"/>
-                </a:tc>
-                <a:tc>
-                  <a:txBody>
-                    <a:bodyPr/>
-                    <a:lstStyle/>
-                    <a:p>
-                      <a:pPr marL="0" marR="0" algn="l">
-                        <a:lnSpc>
-                          <a:spcPct val="107000"/>
-                        </a:lnSpc>
-                        <a:spcBef>
-                          <a:spcPts val="0"/>
-                        </a:spcBef>
-                        <a:spcAft>
-                          <a:spcPts val="0"/>
-                        </a:spcAft>
-                      </a:pPr>
-                      <a:r>
-                        <a:rPr lang="en-US" sz="1200">
-                          <a:effectLst/>
-                        </a:rPr>
-                        <a:t>Few visualizations show only relevant data features; few visualizations are not “cluttered.”</a:t>
-                      </a:r>
-                      <a:endParaRPr lang="en-US" sz="1200">
-                        <a:effectLst/>
-                        <a:latin typeface="Calibri" panose="020F0502020204030204" pitchFamily="34" charset="0"/>
-                        <a:ea typeface="Calibri" panose="020F0502020204030204" pitchFamily="34" charset="0"/>
-                        <a:cs typeface="Times New Roman" panose="02020603050405020304" pitchFamily="18" charset="0"/>
-                      </a:endParaRPr>
-                    </a:p>
-                  </a:txBody>
-                  <a:tcPr marL="48143" marR="48143" marT="0" marB="0"/>
-                </a:tc>
-                <a:extLst>
-                  <a:ext uri="{0D108BD9-81ED-4DB2-BD59-A6C34878D82A}">
-                    <a16:rowId xmlns:a16="http://schemas.microsoft.com/office/drawing/2014/main" val="3647307590"/>
-                  </a:ext>
-                </a:extLst>
-              </a:tr>
-              <a:tr h="465925">
-                <a:tc>
-                  <a:txBody>
-                    <a:bodyPr/>
-                    <a:lstStyle/>
-                    <a:p>
-                      <a:pPr marL="0" marR="0" algn="l">
-                        <a:lnSpc>
-                          <a:spcPct val="107000"/>
-                        </a:lnSpc>
-                        <a:spcBef>
-                          <a:spcPts val="0"/>
-                        </a:spcBef>
-                        <a:spcAft>
-                          <a:spcPts val="0"/>
-                        </a:spcAft>
-                      </a:pPr>
-                      <a:r>
-                        <a:rPr lang="en-US" sz="1800">
-                          <a:effectLst/>
-                        </a:rPr>
-                        <a:t>6. Annotations</a:t>
-                      </a:r>
-                      <a:endParaRPr lang="en-US" sz="1800">
-                        <a:effectLst/>
-                        <a:latin typeface="Calibri" panose="020F0502020204030204" pitchFamily="34" charset="0"/>
-                        <a:ea typeface="Calibri" panose="020F0502020204030204" pitchFamily="34" charset="0"/>
-                        <a:cs typeface="Times New Roman" panose="02020603050405020304" pitchFamily="18" charset="0"/>
-                      </a:endParaRPr>
-                    </a:p>
-                  </a:txBody>
-                  <a:tcPr marL="48143" marR="48143" marT="0" marB="0"/>
-                </a:tc>
-                <a:tc>
-                  <a:txBody>
-                    <a:bodyPr/>
-                    <a:lstStyle/>
-                    <a:p>
-                      <a:pPr marL="0" marR="0" algn="l">
-                        <a:lnSpc>
-                          <a:spcPct val="107000"/>
-                        </a:lnSpc>
-                        <a:spcBef>
-                          <a:spcPts val="0"/>
-                        </a:spcBef>
-                        <a:spcAft>
-                          <a:spcPts val="0"/>
-                        </a:spcAft>
-                      </a:pPr>
-                      <a:r>
-                        <a:rPr lang="en-US" sz="1200">
-                          <a:effectLst/>
-                        </a:rPr>
-                        <a:t>All important data features are highlighted with annotations.</a:t>
-                      </a:r>
-                      <a:endParaRPr lang="en-US" sz="1200">
-                        <a:effectLst/>
-                        <a:latin typeface="Calibri" panose="020F0502020204030204" pitchFamily="34" charset="0"/>
-                        <a:ea typeface="Calibri" panose="020F0502020204030204" pitchFamily="34" charset="0"/>
-                        <a:cs typeface="Times New Roman" panose="02020603050405020304" pitchFamily="18" charset="0"/>
-                      </a:endParaRPr>
-                    </a:p>
-                  </a:txBody>
-                  <a:tcPr marL="48143" marR="48143" marT="0" marB="0"/>
-                </a:tc>
-                <a:tc>
-                  <a:txBody>
-                    <a:bodyPr/>
-                    <a:lstStyle/>
-                    <a:p>
-                      <a:pPr marL="0" marR="0" algn="l">
-                        <a:lnSpc>
-                          <a:spcPct val="107000"/>
-                        </a:lnSpc>
-                        <a:spcBef>
-                          <a:spcPts val="0"/>
-                        </a:spcBef>
-                        <a:spcAft>
-                          <a:spcPts val="0"/>
-                        </a:spcAft>
-                      </a:pPr>
-                      <a:r>
-                        <a:rPr lang="en-US" sz="1200">
-                          <a:effectLst/>
-                        </a:rPr>
-                        <a:t>Some important data features are highlighted with annotations.</a:t>
-                      </a:r>
-                      <a:endParaRPr lang="en-US" sz="1200">
-                        <a:effectLst/>
-                        <a:latin typeface="Calibri" panose="020F0502020204030204" pitchFamily="34" charset="0"/>
-                        <a:ea typeface="Calibri" panose="020F0502020204030204" pitchFamily="34" charset="0"/>
-                        <a:cs typeface="Times New Roman" panose="02020603050405020304" pitchFamily="18" charset="0"/>
-                      </a:endParaRPr>
-                    </a:p>
-                  </a:txBody>
-                  <a:tcPr marL="48143" marR="48143" marT="0" marB="0"/>
-                </a:tc>
-                <a:tc>
-                  <a:txBody>
-                    <a:bodyPr/>
-                    <a:lstStyle/>
-                    <a:p>
-                      <a:pPr marL="0" marR="0" algn="l">
-                        <a:lnSpc>
-                          <a:spcPct val="107000"/>
-                        </a:lnSpc>
-                        <a:spcBef>
-                          <a:spcPts val="0"/>
-                        </a:spcBef>
-                        <a:spcAft>
-                          <a:spcPts val="0"/>
-                        </a:spcAft>
-                      </a:pPr>
-                      <a:r>
-                        <a:rPr lang="en-US" sz="1200">
-                          <a:effectLst/>
-                        </a:rPr>
-                        <a:t>Few important data features are highlighted with annotations.</a:t>
-                      </a:r>
-                      <a:endParaRPr lang="en-US" sz="1200">
-                        <a:effectLst/>
-                        <a:latin typeface="Calibri" panose="020F0502020204030204" pitchFamily="34" charset="0"/>
-                        <a:ea typeface="Calibri" panose="020F0502020204030204" pitchFamily="34" charset="0"/>
-                        <a:cs typeface="Times New Roman" panose="02020603050405020304" pitchFamily="18" charset="0"/>
-                      </a:endParaRPr>
-                    </a:p>
-                  </a:txBody>
-                  <a:tcPr marL="48143" marR="48143" marT="0" marB="0"/>
-                </a:tc>
-                <a:extLst>
-                  <a:ext uri="{0D108BD9-81ED-4DB2-BD59-A6C34878D82A}">
-                    <a16:rowId xmlns:a16="http://schemas.microsoft.com/office/drawing/2014/main" val="3491658901"/>
-                  </a:ext>
-                </a:extLst>
-              </a:tr>
-              <a:tr h="465925">
-                <a:tc>
-                  <a:txBody>
-                    <a:bodyPr/>
-                    <a:lstStyle/>
-                    <a:p>
-                      <a:pPr marL="0" marR="0" algn="l">
-                        <a:lnSpc>
-                          <a:spcPct val="107000"/>
-                        </a:lnSpc>
-                        <a:spcBef>
-                          <a:spcPts val="0"/>
-                        </a:spcBef>
-                        <a:spcAft>
-                          <a:spcPts val="0"/>
-                        </a:spcAft>
-                      </a:pPr>
-                      <a:r>
-                        <a:rPr lang="en-US" sz="1800">
-                          <a:effectLst/>
-                        </a:rPr>
-                        <a:t>7. Cohesion*</a:t>
-                      </a:r>
-                      <a:endParaRPr lang="en-US" sz="1800">
-                        <a:effectLst/>
-                        <a:latin typeface="Calibri" panose="020F0502020204030204" pitchFamily="34" charset="0"/>
-                        <a:ea typeface="Calibri" panose="020F0502020204030204" pitchFamily="34" charset="0"/>
-                        <a:cs typeface="Times New Roman" panose="02020603050405020304" pitchFamily="18" charset="0"/>
-                      </a:endParaRPr>
-                    </a:p>
-                  </a:txBody>
-                  <a:tcPr marL="48143" marR="48143" marT="0" marB="0"/>
-                </a:tc>
-                <a:tc>
-                  <a:txBody>
-                    <a:bodyPr/>
-                    <a:lstStyle/>
-                    <a:p>
-                      <a:pPr marL="0" marR="0" algn="l">
-                        <a:lnSpc>
-                          <a:spcPct val="107000"/>
-                        </a:lnSpc>
-                        <a:spcBef>
-                          <a:spcPts val="0"/>
-                        </a:spcBef>
-                        <a:spcAft>
-                          <a:spcPts val="0"/>
-                        </a:spcAft>
-                      </a:pPr>
-                      <a:r>
-                        <a:rPr lang="en-US" sz="1200">
-                          <a:effectLst/>
-                        </a:rPr>
-                        <a:t>Taken together, all visualizations tell a cohesive story.</a:t>
-                      </a:r>
-                      <a:endParaRPr lang="en-US" sz="1200">
-                        <a:effectLst/>
-                        <a:latin typeface="Calibri" panose="020F0502020204030204" pitchFamily="34" charset="0"/>
-                        <a:ea typeface="Calibri" panose="020F0502020204030204" pitchFamily="34" charset="0"/>
-                        <a:cs typeface="Times New Roman" panose="02020603050405020304" pitchFamily="18" charset="0"/>
-                      </a:endParaRPr>
-                    </a:p>
-                  </a:txBody>
-                  <a:tcPr marL="48143" marR="48143" marT="0" marB="0"/>
-                </a:tc>
-                <a:tc>
-                  <a:txBody>
-                    <a:bodyPr/>
-                    <a:lstStyle/>
-                    <a:p>
-                      <a:pPr marL="0" marR="0" algn="l">
-                        <a:lnSpc>
-                          <a:spcPct val="107000"/>
-                        </a:lnSpc>
-                        <a:spcBef>
-                          <a:spcPts val="0"/>
-                        </a:spcBef>
-                        <a:spcAft>
-                          <a:spcPts val="0"/>
-                        </a:spcAft>
-                      </a:pPr>
-                      <a:r>
-                        <a:rPr lang="en-US" sz="1200">
-                          <a:effectLst/>
-                        </a:rPr>
-                        <a:t>Taken together, most visualizations tell a cohesive story.</a:t>
-                      </a:r>
-                      <a:endParaRPr lang="en-US" sz="1200">
-                        <a:effectLst/>
-                        <a:latin typeface="Calibri" panose="020F0502020204030204" pitchFamily="34" charset="0"/>
-                        <a:ea typeface="Calibri" panose="020F0502020204030204" pitchFamily="34" charset="0"/>
-                        <a:cs typeface="Times New Roman" panose="02020603050405020304" pitchFamily="18" charset="0"/>
-                      </a:endParaRPr>
-                    </a:p>
-                  </a:txBody>
-                  <a:tcPr marL="48143" marR="48143" marT="0" marB="0"/>
-                </a:tc>
-                <a:tc>
-                  <a:txBody>
-                    <a:bodyPr/>
-                    <a:lstStyle/>
-                    <a:p>
-                      <a:pPr marL="0" marR="0" algn="l">
-                        <a:lnSpc>
-                          <a:spcPct val="107000"/>
-                        </a:lnSpc>
-                        <a:spcBef>
-                          <a:spcPts val="0"/>
-                        </a:spcBef>
-                        <a:spcAft>
-                          <a:spcPts val="0"/>
-                        </a:spcAft>
-                      </a:pPr>
-                      <a:r>
-                        <a:rPr lang="en-US" sz="1200">
-                          <a:effectLst/>
-                        </a:rPr>
-                        <a:t>There is very little cohesion in the collection of visualizations.</a:t>
-                      </a:r>
-                      <a:endParaRPr lang="en-US" sz="1200">
-                        <a:effectLst/>
-                        <a:latin typeface="Calibri" panose="020F0502020204030204" pitchFamily="34" charset="0"/>
-                        <a:ea typeface="Calibri" panose="020F0502020204030204" pitchFamily="34" charset="0"/>
-                        <a:cs typeface="Times New Roman" panose="02020603050405020304" pitchFamily="18" charset="0"/>
-                      </a:endParaRPr>
-                    </a:p>
-                  </a:txBody>
-                  <a:tcPr marL="48143" marR="48143" marT="0" marB="0"/>
-                </a:tc>
-                <a:extLst>
-                  <a:ext uri="{0D108BD9-81ED-4DB2-BD59-A6C34878D82A}">
-                    <a16:rowId xmlns:a16="http://schemas.microsoft.com/office/drawing/2014/main" val="1097854881"/>
-                  </a:ext>
-                </a:extLst>
-              </a:tr>
-              <a:tr h="308315">
-                <a:tc>
-                  <a:txBody>
-                    <a:bodyPr/>
-                    <a:lstStyle/>
-                    <a:p>
-                      <a:pPr marL="0" marR="0" algn="l">
-                        <a:lnSpc>
-                          <a:spcPct val="107000"/>
-                        </a:lnSpc>
-                        <a:spcBef>
-                          <a:spcPts val="0"/>
-                        </a:spcBef>
-                        <a:spcAft>
-                          <a:spcPts val="0"/>
-                        </a:spcAft>
-                      </a:pPr>
-                      <a:r>
-                        <a:rPr lang="en-US" sz="1800">
-                          <a:effectLst/>
-                        </a:rPr>
-                        <a:t>8. Aggregation</a:t>
-                      </a:r>
-                      <a:endParaRPr lang="en-US" sz="1800">
-                        <a:effectLst/>
-                        <a:latin typeface="Calibri" panose="020F0502020204030204" pitchFamily="34" charset="0"/>
-                        <a:ea typeface="Calibri" panose="020F0502020204030204" pitchFamily="34" charset="0"/>
-                        <a:cs typeface="Times New Roman" panose="02020603050405020304" pitchFamily="18" charset="0"/>
-                      </a:endParaRPr>
-                    </a:p>
-                  </a:txBody>
-                  <a:tcPr marL="48143" marR="48143" marT="0" marB="0"/>
-                </a:tc>
-                <a:tc>
-                  <a:txBody>
-                    <a:bodyPr/>
-                    <a:lstStyle/>
-                    <a:p>
-                      <a:pPr marL="0" marR="0" algn="l">
-                        <a:lnSpc>
-                          <a:spcPct val="107000"/>
-                        </a:lnSpc>
-                        <a:spcBef>
-                          <a:spcPts val="0"/>
-                        </a:spcBef>
-                        <a:spcAft>
-                          <a:spcPts val="0"/>
-                        </a:spcAft>
-                      </a:pPr>
-                      <a:r>
-                        <a:rPr lang="en-US" sz="1200">
-                          <a:effectLst/>
-                        </a:rPr>
-                        <a:t>All aggregations are appropriate</a:t>
-                      </a:r>
-                      <a:endParaRPr lang="en-US" sz="1200">
-                        <a:effectLst/>
-                        <a:latin typeface="Calibri" panose="020F0502020204030204" pitchFamily="34" charset="0"/>
-                        <a:ea typeface="Calibri" panose="020F0502020204030204" pitchFamily="34" charset="0"/>
-                        <a:cs typeface="Times New Roman" panose="02020603050405020304" pitchFamily="18" charset="0"/>
-                      </a:endParaRPr>
-                    </a:p>
-                  </a:txBody>
-                  <a:tcPr marL="48143" marR="48143" marT="0" marB="0"/>
-                </a:tc>
-                <a:tc>
-                  <a:txBody>
-                    <a:bodyPr/>
-                    <a:lstStyle/>
-                    <a:p>
-                      <a:pPr marL="0" marR="0" algn="l">
-                        <a:lnSpc>
-                          <a:spcPct val="107000"/>
-                        </a:lnSpc>
-                        <a:spcBef>
-                          <a:spcPts val="0"/>
-                        </a:spcBef>
-                        <a:spcAft>
-                          <a:spcPts val="0"/>
-                        </a:spcAft>
-                      </a:pPr>
-                      <a:r>
-                        <a:rPr lang="en-US" sz="1200">
-                          <a:effectLst/>
-                        </a:rPr>
-                        <a:t>Most aggregations are appropriate</a:t>
-                      </a:r>
-                      <a:endParaRPr lang="en-US" sz="1200">
-                        <a:effectLst/>
-                        <a:latin typeface="Calibri" panose="020F0502020204030204" pitchFamily="34" charset="0"/>
-                        <a:ea typeface="Calibri" panose="020F0502020204030204" pitchFamily="34" charset="0"/>
-                        <a:cs typeface="Times New Roman" panose="02020603050405020304" pitchFamily="18" charset="0"/>
-                      </a:endParaRPr>
-                    </a:p>
-                  </a:txBody>
-                  <a:tcPr marL="48143" marR="48143" marT="0" marB="0"/>
-                </a:tc>
-                <a:tc>
-                  <a:txBody>
-                    <a:bodyPr/>
-                    <a:lstStyle/>
-                    <a:p>
-                      <a:pPr marL="0" marR="0" algn="l">
-                        <a:lnSpc>
-                          <a:spcPct val="107000"/>
-                        </a:lnSpc>
-                        <a:spcBef>
-                          <a:spcPts val="0"/>
-                        </a:spcBef>
-                        <a:spcAft>
-                          <a:spcPts val="0"/>
-                        </a:spcAft>
-                      </a:pPr>
-                      <a:r>
-                        <a:rPr lang="en-US" sz="1200">
-                          <a:effectLst/>
-                        </a:rPr>
-                        <a:t>Few aggregations are appropriate</a:t>
-                      </a:r>
-                      <a:endParaRPr lang="en-US" sz="1200">
-                        <a:effectLst/>
-                        <a:latin typeface="Calibri" panose="020F0502020204030204" pitchFamily="34" charset="0"/>
-                        <a:ea typeface="Calibri" panose="020F0502020204030204" pitchFamily="34" charset="0"/>
-                        <a:cs typeface="Times New Roman" panose="02020603050405020304" pitchFamily="18" charset="0"/>
-                      </a:endParaRPr>
-                    </a:p>
-                  </a:txBody>
-                  <a:tcPr marL="48143" marR="48143" marT="0" marB="0"/>
-                </a:tc>
-                <a:extLst>
-                  <a:ext uri="{0D108BD9-81ED-4DB2-BD59-A6C34878D82A}">
-                    <a16:rowId xmlns:a16="http://schemas.microsoft.com/office/drawing/2014/main" val="2681573750"/>
-                  </a:ext>
-                </a:extLst>
-              </a:tr>
-              <a:tr h="465925">
-                <a:tc>
-                  <a:txBody>
-                    <a:bodyPr/>
-                    <a:lstStyle/>
-                    <a:p>
-                      <a:pPr marL="0" marR="0" algn="l">
-                        <a:lnSpc>
-                          <a:spcPct val="107000"/>
-                        </a:lnSpc>
-                        <a:spcBef>
-                          <a:spcPts val="0"/>
-                        </a:spcBef>
-                        <a:spcAft>
-                          <a:spcPts val="0"/>
-                        </a:spcAft>
-                      </a:pPr>
-                      <a:r>
-                        <a:rPr lang="en-US" sz="1800">
-                          <a:effectLst/>
-                        </a:rPr>
-                        <a:t>9. Legends</a:t>
-                      </a:r>
-                      <a:r>
-                        <a:rPr lang="en-US" sz="1800" baseline="30000">
-                          <a:effectLst/>
-                        </a:rPr>
-                        <a:t>††</a:t>
-                      </a:r>
-                      <a:endParaRPr lang="en-US" sz="1800">
-                        <a:effectLst/>
-                        <a:latin typeface="Calibri" panose="020F0502020204030204" pitchFamily="34" charset="0"/>
-                        <a:ea typeface="Calibri" panose="020F0502020204030204" pitchFamily="34" charset="0"/>
-                        <a:cs typeface="Times New Roman" panose="02020603050405020304" pitchFamily="18" charset="0"/>
-                      </a:endParaRPr>
-                    </a:p>
-                  </a:txBody>
-                  <a:tcPr marL="48143" marR="48143" marT="0" marB="0"/>
-                </a:tc>
-                <a:tc>
-                  <a:txBody>
-                    <a:bodyPr/>
-                    <a:lstStyle/>
-                    <a:p>
-                      <a:pPr marL="0" marR="0" algn="l">
-                        <a:lnSpc>
-                          <a:spcPct val="107000"/>
-                        </a:lnSpc>
-                        <a:spcBef>
-                          <a:spcPts val="0"/>
-                        </a:spcBef>
-                        <a:spcAft>
-                          <a:spcPts val="0"/>
-                        </a:spcAft>
-                      </a:pPr>
-                      <a:r>
-                        <a:rPr lang="en-US" sz="1200">
-                          <a:effectLst/>
-                        </a:rPr>
-                        <a:t>All legends are used with discretion and enhance understandability.</a:t>
-                      </a:r>
-                      <a:endParaRPr lang="en-US" sz="1200">
-                        <a:effectLst/>
-                        <a:latin typeface="Calibri" panose="020F0502020204030204" pitchFamily="34" charset="0"/>
-                        <a:ea typeface="Calibri" panose="020F0502020204030204" pitchFamily="34" charset="0"/>
-                        <a:cs typeface="Times New Roman" panose="02020603050405020304" pitchFamily="18" charset="0"/>
-                      </a:endParaRPr>
-                    </a:p>
-                  </a:txBody>
-                  <a:tcPr marL="48143" marR="48143" marT="0" marB="0"/>
-                </a:tc>
-                <a:tc>
-                  <a:txBody>
-                    <a:bodyPr/>
-                    <a:lstStyle/>
-                    <a:p>
-                      <a:pPr marL="0" marR="0" algn="l">
-                        <a:lnSpc>
-                          <a:spcPct val="107000"/>
-                        </a:lnSpc>
-                        <a:spcBef>
-                          <a:spcPts val="0"/>
-                        </a:spcBef>
-                        <a:spcAft>
-                          <a:spcPts val="0"/>
-                        </a:spcAft>
-                      </a:pPr>
-                      <a:r>
-                        <a:rPr lang="en-US" sz="1200">
-                          <a:effectLst/>
-                        </a:rPr>
-                        <a:t>Most legends are used with discretion and enhance understandability.</a:t>
-                      </a:r>
-                      <a:endParaRPr lang="en-US" sz="1200">
-                        <a:effectLst/>
-                        <a:latin typeface="Calibri" panose="020F0502020204030204" pitchFamily="34" charset="0"/>
-                        <a:ea typeface="Calibri" panose="020F0502020204030204" pitchFamily="34" charset="0"/>
-                        <a:cs typeface="Times New Roman" panose="02020603050405020304" pitchFamily="18" charset="0"/>
-                      </a:endParaRPr>
-                    </a:p>
-                  </a:txBody>
-                  <a:tcPr marL="48143" marR="48143" marT="0" marB="0"/>
-                </a:tc>
-                <a:tc>
-                  <a:txBody>
-                    <a:bodyPr/>
-                    <a:lstStyle/>
-                    <a:p>
-                      <a:pPr marL="0" marR="0" algn="l">
-                        <a:lnSpc>
-                          <a:spcPct val="107000"/>
-                        </a:lnSpc>
-                        <a:spcBef>
-                          <a:spcPts val="0"/>
-                        </a:spcBef>
-                        <a:spcAft>
-                          <a:spcPts val="0"/>
-                        </a:spcAft>
-                      </a:pPr>
-                      <a:r>
-                        <a:rPr lang="en-US" sz="1200">
-                          <a:effectLst/>
-                        </a:rPr>
-                        <a:t>Few legends are used with discretion and enhance understandability.</a:t>
-                      </a:r>
-                      <a:endParaRPr lang="en-US" sz="1200">
-                        <a:effectLst/>
-                        <a:latin typeface="Calibri" panose="020F0502020204030204" pitchFamily="34" charset="0"/>
-                        <a:ea typeface="Calibri" panose="020F0502020204030204" pitchFamily="34" charset="0"/>
-                        <a:cs typeface="Times New Roman" panose="02020603050405020304" pitchFamily="18" charset="0"/>
-                      </a:endParaRPr>
-                    </a:p>
-                  </a:txBody>
-                  <a:tcPr marL="48143" marR="48143" marT="0" marB="0"/>
-                </a:tc>
-                <a:extLst>
-                  <a:ext uri="{0D108BD9-81ED-4DB2-BD59-A6C34878D82A}">
-                    <a16:rowId xmlns:a16="http://schemas.microsoft.com/office/drawing/2014/main" val="2481517912"/>
-                  </a:ext>
-                </a:extLst>
-              </a:tr>
-              <a:tr h="465925">
-                <a:tc>
-                  <a:txBody>
-                    <a:bodyPr/>
-                    <a:lstStyle/>
-                    <a:p>
-                      <a:pPr marL="0" marR="0" algn="l">
-                        <a:lnSpc>
-                          <a:spcPct val="107000"/>
-                        </a:lnSpc>
-                        <a:spcBef>
-                          <a:spcPts val="0"/>
-                        </a:spcBef>
-                        <a:spcAft>
-                          <a:spcPts val="0"/>
-                        </a:spcAft>
-                      </a:pPr>
-                      <a:r>
-                        <a:rPr lang="en-US" sz="1800" dirty="0">
-                          <a:effectLst/>
-                        </a:rPr>
-                        <a:t>10. Scrolling</a:t>
-                      </a:r>
-                      <a:endParaRPr lang="en-US" sz="1800" dirty="0">
-                        <a:effectLst/>
-                        <a:latin typeface="Calibri" panose="020F0502020204030204" pitchFamily="34" charset="0"/>
-                        <a:ea typeface="Calibri" panose="020F0502020204030204" pitchFamily="34" charset="0"/>
-                        <a:cs typeface="Times New Roman" panose="02020603050405020304" pitchFamily="18" charset="0"/>
-                      </a:endParaRPr>
-                    </a:p>
-                  </a:txBody>
-                  <a:tcPr marL="48143" marR="48143" marT="0" marB="0"/>
-                </a:tc>
-                <a:tc>
-                  <a:txBody>
-                    <a:bodyPr/>
-                    <a:lstStyle/>
-                    <a:p>
-                      <a:pPr marL="0" marR="0" algn="l">
-                        <a:lnSpc>
-                          <a:spcPct val="107000"/>
-                        </a:lnSpc>
-                        <a:spcBef>
-                          <a:spcPts val="0"/>
-                        </a:spcBef>
-                        <a:spcAft>
-                          <a:spcPts val="0"/>
-                        </a:spcAft>
-                      </a:pPr>
-                      <a:r>
-                        <a:rPr lang="en-US" sz="1200">
-                          <a:effectLst/>
-                        </a:rPr>
-                        <a:t>No scrolling is required, or scrolling is only used when absolutely necessary.</a:t>
-                      </a:r>
-                      <a:endParaRPr lang="en-US" sz="1200">
-                        <a:effectLst/>
-                        <a:latin typeface="Calibri" panose="020F0502020204030204" pitchFamily="34" charset="0"/>
-                        <a:ea typeface="Calibri" panose="020F0502020204030204" pitchFamily="34" charset="0"/>
-                        <a:cs typeface="Times New Roman" panose="02020603050405020304" pitchFamily="18" charset="0"/>
-                      </a:endParaRPr>
-                    </a:p>
-                  </a:txBody>
-                  <a:tcPr marL="48143" marR="48143" marT="0" marB="0"/>
-                </a:tc>
-                <a:tc>
-                  <a:txBody>
-                    <a:bodyPr/>
-                    <a:lstStyle/>
-                    <a:p>
-                      <a:pPr marL="0" marR="0" algn="l">
-                        <a:lnSpc>
-                          <a:spcPct val="107000"/>
-                        </a:lnSpc>
-                        <a:spcBef>
-                          <a:spcPts val="0"/>
-                        </a:spcBef>
-                        <a:spcAft>
-                          <a:spcPts val="0"/>
-                        </a:spcAft>
-                      </a:pPr>
-                      <a:r>
-                        <a:rPr lang="en-US" sz="1200">
-                          <a:effectLst/>
-                        </a:rPr>
-                        <a:t>Scrolling is sometimes required more often than is necessary.</a:t>
-                      </a:r>
-                      <a:endParaRPr lang="en-US" sz="1200">
-                        <a:effectLst/>
-                        <a:latin typeface="Calibri" panose="020F0502020204030204" pitchFamily="34" charset="0"/>
-                        <a:ea typeface="Calibri" panose="020F0502020204030204" pitchFamily="34" charset="0"/>
-                        <a:cs typeface="Times New Roman" panose="02020603050405020304" pitchFamily="18" charset="0"/>
-                      </a:endParaRPr>
-                    </a:p>
-                  </a:txBody>
-                  <a:tcPr marL="48143" marR="48143" marT="0" marB="0"/>
-                </a:tc>
-                <a:tc>
-                  <a:txBody>
-                    <a:bodyPr/>
-                    <a:lstStyle/>
-                    <a:p>
-                      <a:pPr marL="0" marR="0" algn="l">
-                        <a:lnSpc>
-                          <a:spcPct val="107000"/>
-                        </a:lnSpc>
-                        <a:spcBef>
-                          <a:spcPts val="0"/>
-                        </a:spcBef>
-                        <a:spcAft>
-                          <a:spcPts val="0"/>
-                        </a:spcAft>
-                      </a:pPr>
-                      <a:r>
-                        <a:rPr lang="en-US" sz="1200">
-                          <a:effectLst/>
-                        </a:rPr>
-                        <a:t>Scrolling is often required in a haphazard fashion.</a:t>
-                      </a:r>
-                      <a:endParaRPr lang="en-US" sz="1200">
-                        <a:effectLst/>
-                        <a:latin typeface="Calibri" panose="020F0502020204030204" pitchFamily="34" charset="0"/>
-                        <a:ea typeface="Calibri" panose="020F0502020204030204" pitchFamily="34" charset="0"/>
-                        <a:cs typeface="Times New Roman" panose="02020603050405020304" pitchFamily="18" charset="0"/>
-                      </a:endParaRPr>
-                    </a:p>
-                  </a:txBody>
-                  <a:tcPr marL="48143" marR="48143" marT="0" marB="0"/>
-                </a:tc>
-                <a:extLst>
-                  <a:ext uri="{0D108BD9-81ED-4DB2-BD59-A6C34878D82A}">
-                    <a16:rowId xmlns:a16="http://schemas.microsoft.com/office/drawing/2014/main" val="4257547963"/>
-                  </a:ext>
-                </a:extLst>
-              </a:tr>
-              <a:tr h="465925">
-                <a:tc>
-                  <a:txBody>
-                    <a:bodyPr/>
-                    <a:lstStyle/>
-                    <a:p>
-                      <a:pPr marL="0" marR="0" algn="l">
-                        <a:lnSpc>
-                          <a:spcPct val="107000"/>
-                        </a:lnSpc>
-                        <a:spcBef>
-                          <a:spcPts val="0"/>
-                        </a:spcBef>
-                        <a:spcAft>
-                          <a:spcPts val="0"/>
-                        </a:spcAft>
-                      </a:pPr>
-                      <a:r>
-                        <a:rPr lang="en-US" sz="1800" dirty="0">
-                          <a:effectLst/>
-                        </a:rPr>
-                        <a:t>11. Labels and titles**</a:t>
-                      </a:r>
-                      <a:endParaRPr lang="en-US" sz="1800" dirty="0">
-                        <a:effectLst/>
-                        <a:latin typeface="Calibri" panose="020F0502020204030204" pitchFamily="34" charset="0"/>
-                        <a:ea typeface="Calibri" panose="020F0502020204030204" pitchFamily="34" charset="0"/>
-                        <a:cs typeface="Times New Roman" panose="02020603050405020304" pitchFamily="18" charset="0"/>
-                      </a:endParaRPr>
-                    </a:p>
-                  </a:txBody>
-                  <a:tcPr marL="48143" marR="48143" marT="0" marB="0"/>
-                </a:tc>
-                <a:tc>
-                  <a:txBody>
-                    <a:bodyPr/>
-                    <a:lstStyle/>
-                    <a:p>
-                      <a:pPr marL="0" marR="0" algn="l">
-                        <a:lnSpc>
-                          <a:spcPct val="107000"/>
-                        </a:lnSpc>
-                        <a:spcBef>
-                          <a:spcPts val="0"/>
-                        </a:spcBef>
-                        <a:spcAft>
-                          <a:spcPts val="0"/>
-                        </a:spcAft>
-                      </a:pPr>
-                      <a:r>
-                        <a:rPr lang="en-US" sz="1200">
-                          <a:effectLst/>
-                        </a:rPr>
-                        <a:t>All axes and/or legends are clearly labeled and informative.</a:t>
-                      </a:r>
-                      <a:endParaRPr lang="en-US" sz="1200">
-                        <a:effectLst/>
-                        <a:latin typeface="Calibri" panose="020F0502020204030204" pitchFamily="34" charset="0"/>
-                        <a:ea typeface="Calibri" panose="020F0502020204030204" pitchFamily="34" charset="0"/>
-                        <a:cs typeface="Times New Roman" panose="02020603050405020304" pitchFamily="18" charset="0"/>
-                      </a:endParaRPr>
-                    </a:p>
-                  </a:txBody>
-                  <a:tcPr marL="48143" marR="48143" marT="0" marB="0"/>
-                </a:tc>
-                <a:tc>
-                  <a:txBody>
-                    <a:bodyPr/>
-                    <a:lstStyle/>
-                    <a:p>
-                      <a:pPr marL="0" marR="0" algn="l">
-                        <a:lnSpc>
-                          <a:spcPct val="107000"/>
-                        </a:lnSpc>
-                        <a:spcBef>
-                          <a:spcPts val="0"/>
-                        </a:spcBef>
-                        <a:spcAft>
-                          <a:spcPts val="0"/>
-                        </a:spcAft>
-                      </a:pPr>
-                      <a:r>
-                        <a:rPr lang="en-US" sz="1200">
-                          <a:effectLst/>
-                        </a:rPr>
-                        <a:t>Some axes and/or legends are clearly labeled and informative.</a:t>
-                      </a:r>
-                      <a:endParaRPr lang="en-US" sz="1200">
-                        <a:effectLst/>
-                        <a:latin typeface="Calibri" panose="020F0502020204030204" pitchFamily="34" charset="0"/>
-                        <a:ea typeface="Calibri" panose="020F0502020204030204" pitchFamily="34" charset="0"/>
-                        <a:cs typeface="Times New Roman" panose="02020603050405020304" pitchFamily="18" charset="0"/>
-                      </a:endParaRPr>
-                    </a:p>
-                  </a:txBody>
-                  <a:tcPr marL="48143" marR="48143" marT="0" marB="0"/>
-                </a:tc>
-                <a:tc>
-                  <a:txBody>
-                    <a:bodyPr/>
-                    <a:lstStyle/>
-                    <a:p>
-                      <a:pPr marL="0" marR="0" algn="l">
-                        <a:lnSpc>
-                          <a:spcPct val="107000"/>
-                        </a:lnSpc>
-                        <a:spcBef>
-                          <a:spcPts val="0"/>
-                        </a:spcBef>
-                        <a:spcAft>
-                          <a:spcPts val="0"/>
-                        </a:spcAft>
-                      </a:pPr>
-                      <a:r>
-                        <a:rPr lang="en-US" sz="1200">
-                          <a:effectLst/>
-                        </a:rPr>
-                        <a:t>Few axes and/or legends are clearly labeled and informative.</a:t>
-                      </a:r>
-                      <a:endParaRPr lang="en-US" sz="1200">
-                        <a:effectLst/>
-                        <a:latin typeface="Calibri" panose="020F0502020204030204" pitchFamily="34" charset="0"/>
-                        <a:ea typeface="Calibri" panose="020F0502020204030204" pitchFamily="34" charset="0"/>
-                        <a:cs typeface="Times New Roman" panose="02020603050405020304" pitchFamily="18" charset="0"/>
-                      </a:endParaRPr>
-                    </a:p>
-                  </a:txBody>
-                  <a:tcPr marL="48143" marR="48143" marT="0" marB="0"/>
-                </a:tc>
-                <a:extLst>
-                  <a:ext uri="{0D108BD9-81ED-4DB2-BD59-A6C34878D82A}">
-                    <a16:rowId xmlns:a16="http://schemas.microsoft.com/office/drawing/2014/main" val="1269117505"/>
-                  </a:ext>
-                </a:extLst>
-              </a:tr>
-              <a:tr h="465925">
-                <a:tc>
-                  <a:txBody>
-                    <a:bodyPr/>
-                    <a:lstStyle/>
-                    <a:p>
-                      <a:pPr marL="0" marR="0" algn="l">
-                        <a:lnSpc>
-                          <a:spcPct val="107000"/>
-                        </a:lnSpc>
-                        <a:spcBef>
-                          <a:spcPts val="0"/>
-                        </a:spcBef>
-                        <a:spcAft>
-                          <a:spcPts val="0"/>
-                        </a:spcAft>
-                      </a:pPr>
-                      <a:r>
-                        <a:rPr lang="en-US" sz="1800" dirty="0">
-                          <a:effectLst/>
-                        </a:rPr>
-                        <a:t>12. Interactivity (if applicable) </a:t>
-                      </a:r>
-                      <a:endParaRPr lang="en-US" sz="1800" dirty="0">
-                        <a:effectLst/>
-                        <a:latin typeface="Calibri" panose="020F0502020204030204" pitchFamily="34" charset="0"/>
-                        <a:ea typeface="Calibri" panose="020F0502020204030204" pitchFamily="34" charset="0"/>
-                        <a:cs typeface="Times New Roman" panose="02020603050405020304" pitchFamily="18" charset="0"/>
-                      </a:endParaRPr>
-                    </a:p>
-                  </a:txBody>
-                  <a:tcPr marL="48143" marR="48143" marT="0" marB="0"/>
-                </a:tc>
-                <a:tc>
-                  <a:txBody>
-                    <a:bodyPr/>
-                    <a:lstStyle/>
-                    <a:p>
-                      <a:pPr marL="0" marR="0" algn="l">
-                        <a:lnSpc>
-                          <a:spcPct val="107000"/>
-                        </a:lnSpc>
-                        <a:spcBef>
-                          <a:spcPts val="0"/>
-                        </a:spcBef>
-                        <a:spcAft>
-                          <a:spcPts val="0"/>
-                        </a:spcAft>
-                      </a:pPr>
-                      <a:r>
-                        <a:rPr lang="en-US" sz="1200">
-                          <a:effectLst/>
-                        </a:rPr>
-                        <a:t>All interactive aspects help convey the data insights.</a:t>
-                      </a:r>
-                      <a:endParaRPr lang="en-US" sz="1200">
-                        <a:effectLst/>
-                        <a:latin typeface="Calibri" panose="020F0502020204030204" pitchFamily="34" charset="0"/>
-                        <a:ea typeface="Calibri" panose="020F0502020204030204" pitchFamily="34" charset="0"/>
-                        <a:cs typeface="Times New Roman" panose="02020603050405020304" pitchFamily="18" charset="0"/>
-                      </a:endParaRPr>
-                    </a:p>
-                  </a:txBody>
-                  <a:tcPr marL="48143" marR="48143" marT="0" marB="0"/>
-                </a:tc>
-                <a:tc>
-                  <a:txBody>
-                    <a:bodyPr/>
-                    <a:lstStyle/>
-                    <a:p>
-                      <a:pPr marL="0" marR="0" algn="l">
-                        <a:lnSpc>
-                          <a:spcPct val="107000"/>
-                        </a:lnSpc>
-                        <a:spcBef>
-                          <a:spcPts val="0"/>
-                        </a:spcBef>
-                        <a:spcAft>
-                          <a:spcPts val="0"/>
-                        </a:spcAft>
-                      </a:pPr>
-                      <a:r>
-                        <a:rPr lang="en-US" sz="1200">
-                          <a:effectLst/>
-                        </a:rPr>
-                        <a:t>Some interactive aspects help convey the data insights.</a:t>
-                      </a:r>
-                      <a:endParaRPr lang="en-US" sz="1200">
-                        <a:effectLst/>
-                        <a:latin typeface="Calibri" panose="020F0502020204030204" pitchFamily="34" charset="0"/>
-                        <a:ea typeface="Calibri" panose="020F0502020204030204" pitchFamily="34" charset="0"/>
-                        <a:cs typeface="Times New Roman" panose="02020603050405020304" pitchFamily="18" charset="0"/>
-                      </a:endParaRPr>
-                    </a:p>
-                  </a:txBody>
-                  <a:tcPr marL="48143" marR="48143" marT="0" marB="0"/>
-                </a:tc>
-                <a:tc>
-                  <a:txBody>
-                    <a:bodyPr/>
-                    <a:lstStyle/>
-                    <a:p>
-                      <a:pPr marL="0" marR="0" algn="l">
-                        <a:lnSpc>
-                          <a:spcPct val="107000"/>
-                        </a:lnSpc>
-                        <a:spcBef>
-                          <a:spcPts val="0"/>
-                        </a:spcBef>
-                        <a:spcAft>
-                          <a:spcPts val="0"/>
-                        </a:spcAft>
-                      </a:pPr>
-                      <a:r>
-                        <a:rPr lang="en-US" sz="1200" dirty="0">
-                          <a:effectLst/>
-                        </a:rPr>
-                        <a:t>Few interactive aspects help convey the data insights.</a:t>
-                      </a:r>
-                      <a:endParaRPr lang="en-US" sz="1200" dirty="0">
-                        <a:effectLst/>
-                        <a:latin typeface="Calibri" panose="020F0502020204030204" pitchFamily="34" charset="0"/>
-                        <a:ea typeface="Calibri" panose="020F0502020204030204" pitchFamily="34" charset="0"/>
-                        <a:cs typeface="Times New Roman" panose="02020603050405020304" pitchFamily="18" charset="0"/>
-                      </a:endParaRPr>
-                    </a:p>
-                  </a:txBody>
-                  <a:tcPr marL="48143" marR="48143" marT="0" marB="0"/>
-                </a:tc>
-                <a:extLst>
-                  <a:ext uri="{0D108BD9-81ED-4DB2-BD59-A6C34878D82A}">
-                    <a16:rowId xmlns:a16="http://schemas.microsoft.com/office/drawing/2014/main" val="1573994837"/>
-                  </a:ext>
-                </a:extLst>
-              </a:tr>
-            </a:tbl>
-          </a:graphicData>
-        </a:graphic>
-      </p:graphicFrame>
-    </p:spTree>
-    <p:extLst>
-      <p:ext uri="{BB962C8B-B14F-4D97-AF65-F5344CB8AC3E}">
-        <p14:creationId xmlns:p14="http://schemas.microsoft.com/office/powerpoint/2010/main" val="3645773479"/>
-      </p:ext>
-    </p:extLst>
-  </p:cSld>
-  <p:clrMapOvr>
-    <a:masterClrMapping/>
-  </p:clrMapOvr>
-</p:sld>
-</file>
-
-<file path=ppt/slides/slide28.xml><?xml version="1.0" encoding="utf-8"?>
-<p:sld xmlns:a="http://schemas.openxmlformats.org/drawingml/2006/main" xmlns:r="http://schemas.openxmlformats.org/officeDocument/2006/relationships" xmlns:p="http://schemas.openxmlformats.org/presentationml/2006/main">
-  <p:cSld>
-    <p:spTree>
-      <p:nvGrpSpPr>
-        <p:cNvPr id="1" name=""/>
-        <p:cNvGrpSpPr/>
-        <p:nvPr/>
-      </p:nvGrpSpPr>
-      <p:grpSpPr>
-        <a:xfrm>
-          <a:off x="0" y="0"/>
-          <a:ext cx="0" cy="0"/>
-          <a:chOff x="0" y="0"/>
-          <a:chExt cx="0" cy="0"/>
-        </a:xfrm>
-      </p:grpSpPr>
-      <p:sp>
-        <p:nvSpPr>
-          <p:cNvPr id="2" name="Title 1">
-            <a:extLst>
-              <a:ext uri="{FF2B5EF4-FFF2-40B4-BE49-F238E27FC236}">
-                <a16:creationId xmlns:a16="http://schemas.microsoft.com/office/drawing/2014/main" id="{629DA886-3D45-45C6-8A66-E158DCD16500}"/>
-              </a:ext>
-            </a:extLst>
-          </p:cNvPr>
-          <p:cNvSpPr>
-            <a:spLocks noGrp="1"/>
-          </p:cNvSpPr>
-          <p:nvPr>
-            <p:ph type="title"/>
-          </p:nvPr>
-        </p:nvSpPr>
-        <p:spPr/>
-        <p:txBody>
-          <a:bodyPr/>
-          <a:lstStyle/>
-          <a:p>
-            <a:r>
-              <a:rPr lang="en-US" dirty="0"/>
-              <a:t>Final thoughts</a:t>
-            </a:r>
-          </a:p>
-        </p:txBody>
-      </p:sp>
-      <p:sp>
-        <p:nvSpPr>
-          <p:cNvPr id="3" name="Content Placeholder 2">
-            <a:extLst>
-              <a:ext uri="{FF2B5EF4-FFF2-40B4-BE49-F238E27FC236}">
-                <a16:creationId xmlns:a16="http://schemas.microsoft.com/office/drawing/2014/main" id="{BFF7A20C-1BF4-40C4-B61C-47176FFB521F}"/>
-              </a:ext>
-            </a:extLst>
-          </p:cNvPr>
-          <p:cNvSpPr>
-            <a:spLocks noGrp="1"/>
-          </p:cNvSpPr>
-          <p:nvPr>
-            <p:ph idx="1"/>
-          </p:nvPr>
-        </p:nvSpPr>
-        <p:spPr/>
-        <p:txBody>
-          <a:bodyPr>
-            <a:normAutofit fontScale="85000" lnSpcReduction="20000"/>
-          </a:bodyPr>
-          <a:lstStyle/>
-          <a:p>
-            <a:r>
-              <a:rPr lang="en-US" dirty="0"/>
-              <a:t>Interactivity is a double-edged sword!</a:t>
-            </a:r>
-          </a:p>
-          <a:p>
-            <a:endParaRPr lang="en-US" dirty="0"/>
-          </a:p>
-          <a:p>
-            <a:r>
-              <a:rPr lang="en-US" dirty="0"/>
-              <a:t>Don’t be discouraged by first attempts</a:t>
-            </a:r>
-          </a:p>
-          <a:p>
-            <a:endParaRPr lang="en-US" dirty="0"/>
-          </a:p>
-          <a:p>
-            <a:r>
-              <a:rPr lang="en-US" dirty="0"/>
-              <a:t>Peer critique is invaluable</a:t>
-            </a:r>
-          </a:p>
-          <a:p>
-            <a:endParaRPr lang="en-US" dirty="0"/>
-          </a:p>
-          <a:p>
-            <a:r>
-              <a:rPr lang="en-US" dirty="0"/>
-              <a:t>Review of experts is invaluable  #</a:t>
-            </a:r>
-            <a:r>
-              <a:rPr lang="en-US" dirty="0" err="1"/>
-              <a:t>MakeoverMonday</a:t>
-            </a:r>
-            <a:r>
-              <a:rPr lang="en-US" dirty="0"/>
-              <a:t>, </a:t>
-            </a:r>
-            <a:r>
-              <a:rPr lang="en-US" dirty="0" err="1"/>
-              <a:t>FlowingData</a:t>
-            </a:r>
-            <a:endParaRPr lang="en-US" dirty="0"/>
-          </a:p>
-          <a:p>
-            <a:endParaRPr lang="en-US" dirty="0"/>
-          </a:p>
-          <a:p>
-            <a:r>
-              <a:rPr lang="en-US" dirty="0"/>
-              <a:t>2 phases; can we emphasize both?</a:t>
-            </a:r>
-          </a:p>
-          <a:p>
-            <a:pPr lvl="1"/>
-            <a:r>
-              <a:rPr lang="en-US" dirty="0"/>
-              <a:t>Finding the story</a:t>
-            </a:r>
-          </a:p>
-          <a:p>
-            <a:pPr lvl="1"/>
-            <a:r>
-              <a:rPr lang="en-US" dirty="0"/>
-              <a:t>Crafting the story</a:t>
-            </a:r>
-          </a:p>
-          <a:p>
-            <a:pPr marL="0" indent="0">
-              <a:buNone/>
-            </a:pPr>
-            <a:endParaRPr lang="en-US" dirty="0"/>
-          </a:p>
-          <a:p>
-            <a:endParaRPr lang="en-US" dirty="0"/>
-          </a:p>
-        </p:txBody>
-      </p:sp>
-    </p:spTree>
-    <p:extLst>
-      <p:ext uri="{BB962C8B-B14F-4D97-AF65-F5344CB8AC3E}">
-        <p14:creationId xmlns:p14="http://schemas.microsoft.com/office/powerpoint/2010/main" val="122183373"/>
       </p:ext>
     </p:extLst>
   </p:cSld>
@@ -10366,18 +7410,6 @@
   <p:clrMapOvr>
     <a:masterClrMapping/>
   </p:clrMapOvr>
-  <mc:AlternateContent xmlns:mc="http://schemas.openxmlformats.org/markup-compatibility/2006" xmlns:p14="http://schemas.microsoft.com/office/powerpoint/2010/main">
-    <mc:Choice Requires="p14">
-      <p:transition spd="med" p14:dur="700">
-        <p:fade/>
-      </p:transition>
-    </mc:Choice>
-    <mc:Fallback xmlns="">
-      <p:transition spd="med">
-        <p:fade/>
-      </p:transition>
-    </mc:Fallback>
-  </mc:AlternateContent>
 </p:sld>
 </file>
 
@@ -10521,18 +7553,6 @@
   <p:clrMapOvr>
     <a:masterClrMapping/>
   </p:clrMapOvr>
-  <mc:AlternateContent xmlns:mc="http://schemas.openxmlformats.org/markup-compatibility/2006" xmlns:p14="http://schemas.microsoft.com/office/powerpoint/2010/main">
-    <mc:Choice Requires="p14">
-      <p:transition spd="med" p14:dur="700">
-        <p:fade/>
-      </p:transition>
-    </mc:Choice>
-    <mc:Fallback xmlns="">
-      <p:transition spd="med">
-        <p:fade/>
-      </p:transition>
-    </mc:Fallback>
-  </mc:AlternateContent>
 </p:sld>
 </file>
 
@@ -10703,18 +7723,6 @@
   <p:clrMapOvr>
     <a:masterClrMapping/>
   </p:clrMapOvr>
-  <mc:AlternateContent xmlns:mc="http://schemas.openxmlformats.org/markup-compatibility/2006" xmlns:p14="http://schemas.microsoft.com/office/powerpoint/2010/main">
-    <mc:Choice Requires="p14">
-      <p:transition spd="med" p14:dur="700">
-        <p:fade/>
-      </p:transition>
-    </mc:Choice>
-    <mc:Fallback xmlns="">
-      <p:transition spd="med">
-        <p:fade/>
-      </p:transition>
-    </mc:Fallback>
-  </mc:AlternateContent>
 </p:sld>
 </file>
 
@@ -10845,18 +7853,6 @@
   <p:clrMapOvr>
     <a:masterClrMapping/>
   </p:clrMapOvr>
-  <mc:AlternateContent xmlns:mc="http://schemas.openxmlformats.org/markup-compatibility/2006" xmlns:p14="http://schemas.microsoft.com/office/powerpoint/2010/main">
-    <mc:Choice Requires="p14">
-      <p:transition spd="med" p14:dur="700">
-        <p:fade/>
-      </p:transition>
-    </mc:Choice>
-    <mc:Fallback xmlns="">
-      <p:transition spd="med">
-        <p:fade/>
-      </p:transition>
-    </mc:Fallback>
-  </mc:AlternateContent>
 </p:sld>
 </file>
 
@@ -10948,18 +7944,6 @@
   <p:clrMapOvr>
     <a:masterClrMapping/>
   </p:clrMapOvr>
-  <mc:AlternateContent xmlns:mc="http://schemas.openxmlformats.org/markup-compatibility/2006" xmlns:p14="http://schemas.microsoft.com/office/powerpoint/2010/main">
-    <mc:Choice Requires="p14">
-      <p:transition spd="med" p14:dur="700">
-        <p:fade/>
-      </p:transition>
-    </mc:Choice>
-    <mc:Fallback xmlns="">
-      <p:transition spd="med">
-        <p:fade/>
-      </p:transition>
-    </mc:Fallback>
-  </mc:AlternateContent>
 </p:sld>
 </file>
 
@@ -11262,18 +8246,6 @@
   <p:clrMapOvr>
     <a:masterClrMapping/>
   </p:clrMapOvr>
-  <mc:AlternateContent xmlns:mc="http://schemas.openxmlformats.org/markup-compatibility/2006" xmlns:p14="http://schemas.microsoft.com/office/powerpoint/2010/main">
-    <mc:Choice Requires="p14">
-      <p:transition spd="med" p14:dur="700">
-        <p:fade/>
-      </p:transition>
-    </mc:Choice>
-    <mc:Fallback xmlns="">
-      <p:transition spd="med">
-        <p:fade/>
-      </p:transition>
-    </mc:Fallback>
-  </mc:AlternateContent>
 </p:sld>
 </file>
 
@@ -11521,18 +8493,6 @@
   <p:clrMapOvr>
     <a:masterClrMapping/>
   </p:clrMapOvr>
-  <mc:AlternateContent xmlns:mc="http://schemas.openxmlformats.org/markup-compatibility/2006" xmlns:p14="http://schemas.microsoft.com/office/powerpoint/2010/main">
-    <mc:Choice Requires="p14">
-      <p:transition spd="med" p14:dur="700">
-        <p:fade/>
-      </p:transition>
-    </mc:Choice>
-    <mc:Fallback xmlns="">
-      <p:transition spd="med">
-        <p:fade/>
-      </p:transition>
-    </mc:Fallback>
-  </mc:AlternateContent>
 </p:sld>
 </file>
 

</xml_diff>